<commit_message>
Updates for release and docs
</commit_message>
<xml_diff>
--- a/docs/mabool_exelvision_cover.pptx
+++ b/docs/mabool_exelvision_cover.pptx
@@ -9,22 +9,23 @@
     <p:sldId id="266" r:id="rId3"/>
     <p:sldId id="274" r:id="rId4"/>
     <p:sldId id="269" r:id="rId5"/>
-    <p:sldId id="278" r:id="rId6"/>
-    <p:sldId id="264" r:id="rId7"/>
-    <p:sldId id="277" r:id="rId8"/>
-    <p:sldId id="276" r:id="rId9"/>
-    <p:sldId id="272" r:id="rId10"/>
-    <p:sldId id="268" r:id="rId11"/>
-    <p:sldId id="262" r:id="rId12"/>
-    <p:sldId id="270" r:id="rId13"/>
-    <p:sldId id="265" r:id="rId14"/>
-    <p:sldId id="271" r:id="rId15"/>
-    <p:sldId id="267" r:id="rId16"/>
-    <p:sldId id="273" r:id="rId17"/>
-    <p:sldId id="281" r:id="rId18"/>
-    <p:sldId id="257" r:id="rId19"/>
-    <p:sldId id="259" r:id="rId20"/>
-    <p:sldId id="258" r:id="rId21"/>
+    <p:sldId id="282" r:id="rId6"/>
+    <p:sldId id="278" r:id="rId7"/>
+    <p:sldId id="264" r:id="rId8"/>
+    <p:sldId id="277" r:id="rId9"/>
+    <p:sldId id="276" r:id="rId10"/>
+    <p:sldId id="272" r:id="rId11"/>
+    <p:sldId id="268" r:id="rId12"/>
+    <p:sldId id="262" r:id="rId13"/>
+    <p:sldId id="270" r:id="rId14"/>
+    <p:sldId id="265" r:id="rId15"/>
+    <p:sldId id="271" r:id="rId16"/>
+    <p:sldId id="267" r:id="rId17"/>
+    <p:sldId id="273" r:id="rId18"/>
+    <p:sldId id="281" r:id="rId19"/>
+    <p:sldId id="257" r:id="rId20"/>
+    <p:sldId id="259" r:id="rId21"/>
+    <p:sldId id="258" r:id="rId22"/>
   </p:sldIdLst>
   <p:sldSz cx="12192000" cy="6858000"/>
   <p:notesSz cx="6858000" cy="9144000"/>
@@ -1433,7 +1434,7 @@
           <a:p>
             <a:fld id="{BE9DA22A-5204-4573-9C67-011E2DB24967}" type="datetimeFigureOut">
               <a:rPr lang="fr-FR" smtClean="0"/>
-              <a:t>31/12/2022</a:t>
+              <a:t>01/01/2023</a:t>
             </a:fld>
             <a:endParaRPr lang="fr-FR"/>
           </a:p>
@@ -1631,7 +1632,7 @@
           <a:p>
             <a:fld id="{BE9DA22A-5204-4573-9C67-011E2DB24967}" type="datetimeFigureOut">
               <a:rPr lang="fr-FR" smtClean="0"/>
-              <a:t>31/12/2022</a:t>
+              <a:t>01/01/2023</a:t>
             </a:fld>
             <a:endParaRPr lang="fr-FR"/>
           </a:p>
@@ -1839,7 +1840,7 @@
           <a:p>
             <a:fld id="{BE9DA22A-5204-4573-9C67-011E2DB24967}" type="datetimeFigureOut">
               <a:rPr lang="fr-FR" smtClean="0"/>
-              <a:t>31/12/2022</a:t>
+              <a:t>01/01/2023</a:t>
             </a:fld>
             <a:endParaRPr lang="fr-FR"/>
           </a:p>
@@ -2037,7 +2038,7 @@
           <a:p>
             <a:fld id="{BE9DA22A-5204-4573-9C67-011E2DB24967}" type="datetimeFigureOut">
               <a:rPr lang="fr-FR" smtClean="0"/>
-              <a:t>31/12/2022</a:t>
+              <a:t>01/01/2023</a:t>
             </a:fld>
             <a:endParaRPr lang="fr-FR"/>
           </a:p>
@@ -2312,7 +2313,7 @@
           <a:p>
             <a:fld id="{BE9DA22A-5204-4573-9C67-011E2DB24967}" type="datetimeFigureOut">
               <a:rPr lang="fr-FR" smtClean="0"/>
-              <a:t>31/12/2022</a:t>
+              <a:t>01/01/2023</a:t>
             </a:fld>
             <a:endParaRPr lang="fr-FR"/>
           </a:p>
@@ -2577,7 +2578,7 @@
           <a:p>
             <a:fld id="{BE9DA22A-5204-4573-9C67-011E2DB24967}" type="datetimeFigureOut">
               <a:rPr lang="fr-FR" smtClean="0"/>
-              <a:t>31/12/2022</a:t>
+              <a:t>01/01/2023</a:t>
             </a:fld>
             <a:endParaRPr lang="fr-FR"/>
           </a:p>
@@ -2989,7 +2990,7 @@
           <a:p>
             <a:fld id="{BE9DA22A-5204-4573-9C67-011E2DB24967}" type="datetimeFigureOut">
               <a:rPr lang="fr-FR" smtClean="0"/>
-              <a:t>31/12/2022</a:t>
+              <a:t>01/01/2023</a:t>
             </a:fld>
             <a:endParaRPr lang="fr-FR"/>
           </a:p>
@@ -3130,7 +3131,7 @@
           <a:p>
             <a:fld id="{BE9DA22A-5204-4573-9C67-011E2DB24967}" type="datetimeFigureOut">
               <a:rPr lang="fr-FR" smtClean="0"/>
-              <a:t>31/12/2022</a:t>
+              <a:t>01/01/2023</a:t>
             </a:fld>
             <a:endParaRPr lang="fr-FR"/>
           </a:p>
@@ -3243,7 +3244,7 @@
           <a:p>
             <a:fld id="{BE9DA22A-5204-4573-9C67-011E2DB24967}" type="datetimeFigureOut">
               <a:rPr lang="fr-FR" smtClean="0"/>
-              <a:t>31/12/2022</a:t>
+              <a:t>01/01/2023</a:t>
             </a:fld>
             <a:endParaRPr lang="fr-FR"/>
           </a:p>
@@ -3554,7 +3555,7 @@
           <a:p>
             <a:fld id="{BE9DA22A-5204-4573-9C67-011E2DB24967}" type="datetimeFigureOut">
               <a:rPr lang="fr-FR" smtClean="0"/>
-              <a:t>31/12/2022</a:t>
+              <a:t>01/01/2023</a:t>
             </a:fld>
             <a:endParaRPr lang="fr-FR"/>
           </a:p>
@@ -3842,7 +3843,7 @@
           <a:p>
             <a:fld id="{BE9DA22A-5204-4573-9C67-011E2DB24967}" type="datetimeFigureOut">
               <a:rPr lang="fr-FR" smtClean="0"/>
-              <a:t>31/12/2022</a:t>
+              <a:t>01/01/2023</a:t>
             </a:fld>
             <a:endParaRPr lang="fr-FR"/>
           </a:p>
@@ -4083,7 +4084,7 @@
           <a:p>
             <a:fld id="{BE9DA22A-5204-4573-9C67-011E2DB24967}" type="datetimeFigureOut">
               <a:rPr lang="fr-FR" smtClean="0"/>
-              <a:t>31/12/2022</a:t>
+              <a:t>01/01/2023</a:t>
             </a:fld>
             <a:endParaRPr lang="fr-FR"/>
           </a:p>
@@ -4502,36 +4503,6 @@
       </p:grpSpPr>
       <p:pic>
         <p:nvPicPr>
-          <p:cNvPr id="12" name="Image 11">
-            <a:extLst>
-              <a:ext uri="{FF2B5EF4-FFF2-40B4-BE49-F238E27FC236}">
-                <a16:creationId xmlns:a16="http://schemas.microsoft.com/office/drawing/2014/main" id="{CA69817F-9F6A-10C2-585D-B746E4F0CCDF}"/>
-              </a:ext>
-            </a:extLst>
-          </p:cNvPr>
-          <p:cNvPicPr>
-            <a:picLocks noChangeAspect="1"/>
-          </p:cNvPicPr>
-          <p:nvPr/>
-        </p:nvPicPr>
-        <p:blipFill>
-          <a:blip r:embed="rId2"/>
-          <a:stretch>
-            <a:fillRect/>
-          </a:stretch>
-        </p:blipFill>
-        <p:spPr>
-          <a:xfrm>
-            <a:off x="2543214" y="809432"/>
-            <a:ext cx="2439718" cy="1767514"/>
-          </a:xfrm>
-          <a:prstGeom prst="rect">
-            <a:avLst/>
-          </a:prstGeom>
-        </p:spPr>
-      </p:pic>
-      <p:pic>
-        <p:nvPicPr>
           <p:cNvPr id="2" name="Picture 8" descr="Rétro Jeu Hippie Néon Paysage Avec Labyrinthe Obscur Clip Art Libres De  Droits , Svg , Vecteurs Et Illustration. Image 48483234.">
             <a:extLst>
               <a:ext uri="{FF2B5EF4-FFF2-40B4-BE49-F238E27FC236}">
@@ -4545,7 +4516,7 @@
           <p:nvPr/>
         </p:nvPicPr>
         <p:blipFill rotWithShape="1">
-          <a:blip r:embed="rId3">
+          <a:blip r:embed="rId2">
             <a:extLst>
               <a:ext uri="{28A0092B-C50C-407E-A947-70E740481C1C}">
                 <a14:useLocalDpi xmlns:a14="http://schemas.microsoft.com/office/drawing/2010/main" val="0"/>
@@ -4577,42 +4548,6 @@
       </p:pic>
       <p:pic>
         <p:nvPicPr>
-          <p:cNvPr id="5" name="Image 4">
-            <a:extLst>
-              <a:ext uri="{FF2B5EF4-FFF2-40B4-BE49-F238E27FC236}">
-                <a16:creationId xmlns:a16="http://schemas.microsoft.com/office/drawing/2014/main" id="{EA5C5890-E08D-3E53-A27A-E8939FE99565}"/>
-              </a:ext>
-            </a:extLst>
-          </p:cNvPr>
-          <p:cNvPicPr>
-            <a:picLocks noChangeAspect="1"/>
-          </p:cNvPicPr>
-          <p:nvPr/>
-        </p:nvPicPr>
-        <p:blipFill>
-          <a:blip r:embed="rId4">
-            <a:extLst>
-              <a:ext uri="{28A0092B-C50C-407E-A947-70E740481C1C}">
-                <a14:useLocalDpi xmlns:a14="http://schemas.microsoft.com/office/drawing/2010/main" val="0"/>
-              </a:ext>
-            </a:extLst>
-          </a:blip>
-          <a:stretch>
-            <a:fillRect/>
-          </a:stretch>
-        </p:blipFill>
-        <p:spPr>
-          <a:xfrm>
-            <a:off x="2342427" y="604062"/>
-            <a:ext cx="8024382" cy="6091384"/>
-          </a:xfrm>
-          <a:prstGeom prst="rect">
-            <a:avLst/>
-          </a:prstGeom>
-        </p:spPr>
-      </p:pic>
-      <p:pic>
-        <p:nvPicPr>
           <p:cNvPr id="8" name="Image 7">
             <a:extLst>
               <a:ext uri="{FF2B5EF4-FFF2-40B4-BE49-F238E27FC236}">
@@ -4626,7 +4561,7 @@
           <p:nvPr/>
         </p:nvPicPr>
         <p:blipFill rotWithShape="1">
-          <a:blip r:embed="rId5"/>
+          <a:blip r:embed="rId3"/>
           <a:srcRect t="71078"/>
           <a:stretch/>
         </p:blipFill>
@@ -4663,7 +4598,7 @@
           <p:nvPr/>
         </p:nvPicPr>
         <p:blipFill rotWithShape="1">
-          <a:blip r:embed="rId5"/>
+          <a:blip r:embed="rId3"/>
           <a:srcRect l="14769" r="17977" b="29280"/>
           <a:stretch/>
         </p:blipFill>
@@ -4687,6 +4622,78 @@
       </p:pic>
       <p:pic>
         <p:nvPicPr>
+          <p:cNvPr id="18" name="Image 17">
+            <a:extLst>
+              <a:ext uri="{FF2B5EF4-FFF2-40B4-BE49-F238E27FC236}">
+                <a16:creationId xmlns:a16="http://schemas.microsoft.com/office/drawing/2014/main" id="{7C309B55-762A-E918-F929-991D280D3529}"/>
+              </a:ext>
+            </a:extLst>
+          </p:cNvPr>
+          <p:cNvPicPr>
+            <a:picLocks noChangeAspect="1"/>
+          </p:cNvPicPr>
+          <p:nvPr/>
+        </p:nvPicPr>
+        <p:blipFill>
+          <a:blip r:embed="rId4">
+            <a:extLst>
+              <a:ext uri="{28A0092B-C50C-407E-A947-70E740481C1C}">
+                <a14:useLocalDpi xmlns:a14="http://schemas.microsoft.com/office/drawing/2010/main" val="0"/>
+              </a:ext>
+            </a:extLst>
+          </a:blip>
+          <a:stretch>
+            <a:fillRect/>
+          </a:stretch>
+        </p:blipFill>
+        <p:spPr>
+          <a:xfrm>
+            <a:off x="2624861" y="829956"/>
+            <a:ext cx="2246446" cy="1805180"/>
+          </a:xfrm>
+          <a:prstGeom prst="rect">
+            <a:avLst/>
+          </a:prstGeom>
+        </p:spPr>
+      </p:pic>
+      <p:pic>
+        <p:nvPicPr>
+          <p:cNvPr id="16" name="Image 15">
+            <a:extLst>
+              <a:ext uri="{FF2B5EF4-FFF2-40B4-BE49-F238E27FC236}">
+                <a16:creationId xmlns:a16="http://schemas.microsoft.com/office/drawing/2014/main" id="{9747D140-D47E-3881-2848-2F1D0F1F7D88}"/>
+              </a:ext>
+            </a:extLst>
+          </p:cNvPr>
+          <p:cNvPicPr>
+            <a:picLocks noChangeAspect="1"/>
+          </p:cNvPicPr>
+          <p:nvPr/>
+        </p:nvPicPr>
+        <p:blipFill>
+          <a:blip r:embed="rId5">
+            <a:extLst>
+              <a:ext uri="{28A0092B-C50C-407E-A947-70E740481C1C}">
+                <a14:useLocalDpi xmlns:a14="http://schemas.microsoft.com/office/drawing/2010/main" val="0"/>
+              </a:ext>
+            </a:extLst>
+          </a:blip>
+          <a:stretch>
+            <a:fillRect/>
+          </a:stretch>
+        </p:blipFill>
+        <p:spPr>
+          <a:xfrm>
+            <a:off x="2342427" y="604062"/>
+            <a:ext cx="8024382" cy="6091384"/>
+          </a:xfrm>
+          <a:prstGeom prst="rect">
+            <a:avLst/>
+          </a:prstGeom>
+        </p:spPr>
+      </p:pic>
+      <p:pic>
+        <p:nvPicPr>
           <p:cNvPr id="10" name="Image 9">
             <a:extLst>
               <a:ext uri="{FF2B5EF4-FFF2-40B4-BE49-F238E27FC236}">
@@ -4700,7 +4707,7 @@
           <p:nvPr/>
         </p:nvPicPr>
         <p:blipFill rotWithShape="1">
-          <a:blip r:embed="rId5"/>
+          <a:blip r:embed="rId3"/>
           <a:srcRect t="71078"/>
           <a:stretch/>
         </p:blipFill>
@@ -4939,7 +4946,7 @@
             </a:r>
             <a:r>
               <a:rPr lang="fr-FR" dirty="0"/>
-              <a:t>, aventurier rondouillard, se retrouve enfermé dans un château obscure. Afin de s’échapper, il devra sortir de chacune des salles de ce lugubre bâtiment, en ramassant toutes les étoiles et clé présentes, qui ouvriront la porte de sortie.</a:t>
+              <a:t>, aventurier rondouillard, se retrouve enfermé dans un château obscur. Afin de s’échapper, il devra sortir de chacune des salles de ce lugubre bâtiment, en ramassant toutes les étoiles et clés présentes, qui ouvriront la porte de sortie.</a:t>
             </a:r>
           </a:p>
         </p:txBody>
@@ -5588,6 +5595,880 @@
           </a:p>
         </p:txBody>
       </p:sp>
+      <p:sp>
+        <p:nvSpPr>
+          <p:cNvPr id="13" name="ZoneTexte 12">
+            <a:extLst>
+              <a:ext uri="{FF2B5EF4-FFF2-40B4-BE49-F238E27FC236}">
+                <a16:creationId xmlns:a16="http://schemas.microsoft.com/office/drawing/2014/main" id="{594700FB-AEB1-AE31-EF82-2E62536C8379}"/>
+              </a:ext>
+            </a:extLst>
+          </p:cNvPr>
+          <p:cNvSpPr txBox="1"/>
+          <p:nvPr/>
+        </p:nvSpPr>
+        <p:spPr>
+          <a:xfrm>
+            <a:off x="2676179" y="1321376"/>
+            <a:ext cx="3777448" cy="338553"/>
+          </a:xfrm>
+          <a:prstGeom prst="rect">
+            <a:avLst/>
+          </a:prstGeom>
+          <a:noFill/>
+        </p:spPr>
+        <p:txBody>
+          <a:bodyPr wrap="square" rtlCol="0">
+            <a:spAutoFit/>
+          </a:bodyPr>
+          <a:lstStyle/>
+          <a:p>
+            <a:r>
+              <a:rPr lang="fr-FR" sz="1600" i="1" dirty="0">
+                <a:latin typeface="Century Gothic" panose="020B0502020202020204" pitchFamily="34" charset="0"/>
+              </a:rPr>
+              <a:t>Our </a:t>
+            </a:r>
+            <a:r>
+              <a:rPr lang="fr-FR" sz="1600" i="1" dirty="0" err="1">
+                <a:latin typeface="Century Gothic" panose="020B0502020202020204" pitchFamily="34" charset="0"/>
+              </a:rPr>
+              <a:t>hero</a:t>
+            </a:r>
+            <a:r>
+              <a:rPr lang="fr-FR" sz="1600" i="1" dirty="0">
+                <a:latin typeface="Century Gothic" panose="020B0502020202020204" pitchFamily="34" charset="0"/>
+              </a:rPr>
+              <a:t>, </a:t>
+            </a:r>
+            <a:r>
+              <a:rPr lang="fr-FR" sz="1600" i="1" dirty="0" err="1">
+                <a:latin typeface="Century Gothic" panose="020B0502020202020204" pitchFamily="34" charset="0"/>
+              </a:rPr>
+              <a:t>Mabool</a:t>
+            </a:r>
+            <a:r>
+              <a:rPr lang="fr-FR" sz="1600" i="1" dirty="0">
+                <a:latin typeface="Century Gothic" panose="020B0502020202020204" pitchFamily="34" charset="0"/>
+              </a:rPr>
+              <a:t>.</a:t>
+            </a:r>
+          </a:p>
+        </p:txBody>
+      </p:sp>
+      <p:pic>
+        <p:nvPicPr>
+          <p:cNvPr id="7" name="Image 6">
+            <a:extLst>
+              <a:ext uri="{FF2B5EF4-FFF2-40B4-BE49-F238E27FC236}">
+                <a16:creationId xmlns:a16="http://schemas.microsoft.com/office/drawing/2014/main" id="{833371FA-8E6F-4995-0CA7-762D23E8502D}"/>
+              </a:ext>
+            </a:extLst>
+          </p:cNvPr>
+          <p:cNvPicPr>
+            <a:picLocks noChangeAspect="1"/>
+          </p:cNvPicPr>
+          <p:nvPr/>
+        </p:nvPicPr>
+        <p:blipFill>
+          <a:blip r:embed="rId2"/>
+          <a:stretch>
+            <a:fillRect/>
+          </a:stretch>
+        </p:blipFill>
+        <p:spPr>
+          <a:xfrm>
+            <a:off x="2077756" y="1211890"/>
+            <a:ext cx="446022" cy="557527"/>
+          </a:xfrm>
+          <a:prstGeom prst="rect">
+            <a:avLst/>
+          </a:prstGeom>
+        </p:spPr>
+      </p:pic>
+      <p:pic>
+        <p:nvPicPr>
+          <p:cNvPr id="14" name="Image 13">
+            <a:extLst>
+              <a:ext uri="{FF2B5EF4-FFF2-40B4-BE49-F238E27FC236}">
+                <a16:creationId xmlns:a16="http://schemas.microsoft.com/office/drawing/2014/main" id="{EBF38A5B-3E5B-DD04-FB25-B43A1ADF3364}"/>
+              </a:ext>
+            </a:extLst>
+          </p:cNvPr>
+          <p:cNvPicPr>
+            <a:picLocks noChangeAspect="1"/>
+          </p:cNvPicPr>
+          <p:nvPr/>
+        </p:nvPicPr>
+        <p:blipFill>
+          <a:blip r:embed="rId3"/>
+          <a:stretch>
+            <a:fillRect/>
+          </a:stretch>
+        </p:blipFill>
+        <p:spPr>
+          <a:xfrm>
+            <a:off x="1631734" y="1899693"/>
+            <a:ext cx="446023" cy="557529"/>
+          </a:xfrm>
+          <a:prstGeom prst="rect">
+            <a:avLst/>
+          </a:prstGeom>
+        </p:spPr>
+      </p:pic>
+      <p:pic>
+        <p:nvPicPr>
+          <p:cNvPr id="17" name="Image 16">
+            <a:extLst>
+              <a:ext uri="{FF2B5EF4-FFF2-40B4-BE49-F238E27FC236}">
+                <a16:creationId xmlns:a16="http://schemas.microsoft.com/office/drawing/2014/main" id="{8226D2FA-6059-D647-E7E9-B40CB6B45F0E}"/>
+              </a:ext>
+            </a:extLst>
+          </p:cNvPr>
+          <p:cNvPicPr>
+            <a:picLocks noChangeAspect="1"/>
+          </p:cNvPicPr>
+          <p:nvPr/>
+        </p:nvPicPr>
+        <p:blipFill>
+          <a:blip r:embed="rId4"/>
+          <a:stretch>
+            <a:fillRect/>
+          </a:stretch>
+        </p:blipFill>
+        <p:spPr>
+          <a:xfrm>
+            <a:off x="2077756" y="1899693"/>
+            <a:ext cx="446021" cy="557526"/>
+          </a:xfrm>
+          <a:prstGeom prst="rect">
+            <a:avLst/>
+          </a:prstGeom>
+        </p:spPr>
+      </p:pic>
+      <p:sp>
+        <p:nvSpPr>
+          <p:cNvPr id="18" name="ZoneTexte 17">
+            <a:extLst>
+              <a:ext uri="{FF2B5EF4-FFF2-40B4-BE49-F238E27FC236}">
+                <a16:creationId xmlns:a16="http://schemas.microsoft.com/office/drawing/2014/main" id="{81ABB822-6853-48F3-97FA-A50115BBB710}"/>
+              </a:ext>
+            </a:extLst>
+          </p:cNvPr>
+          <p:cNvSpPr txBox="1"/>
+          <p:nvPr/>
+        </p:nvSpPr>
+        <p:spPr>
+          <a:xfrm>
+            <a:off x="2676179" y="2009179"/>
+            <a:ext cx="3777448" cy="338554"/>
+          </a:xfrm>
+          <a:prstGeom prst="rect">
+            <a:avLst/>
+          </a:prstGeom>
+          <a:noFill/>
+        </p:spPr>
+        <p:txBody>
+          <a:bodyPr wrap="square" rtlCol="0">
+            <a:spAutoFit/>
+          </a:bodyPr>
+          <a:lstStyle/>
+          <a:p>
+            <a:r>
+              <a:rPr lang="fr-FR" sz="1600" i="1" dirty="0">
+                <a:latin typeface="Century Gothic" panose="020B0502020202020204" pitchFamily="34" charset="0"/>
+              </a:rPr>
+              <a:t>Stars &amp; key to </a:t>
+            </a:r>
+            <a:r>
+              <a:rPr lang="fr-FR" sz="1600" i="1" dirty="0" err="1">
+                <a:latin typeface="Century Gothic" panose="020B0502020202020204" pitchFamily="34" charset="0"/>
+              </a:rPr>
+              <a:t>collect</a:t>
+            </a:r>
+            <a:r>
+              <a:rPr lang="fr-FR" sz="1600" i="1" dirty="0">
+                <a:latin typeface="Century Gothic" panose="020B0502020202020204" pitchFamily="34" charset="0"/>
+              </a:rPr>
+              <a:t>.</a:t>
+            </a:r>
+          </a:p>
+        </p:txBody>
+      </p:sp>
+      <p:pic>
+        <p:nvPicPr>
+          <p:cNvPr id="20" name="Image 19">
+            <a:extLst>
+              <a:ext uri="{FF2B5EF4-FFF2-40B4-BE49-F238E27FC236}">
+                <a16:creationId xmlns:a16="http://schemas.microsoft.com/office/drawing/2014/main" id="{62B38F98-ACB7-FA85-192D-5FF95514A7F9}"/>
+              </a:ext>
+            </a:extLst>
+          </p:cNvPr>
+          <p:cNvPicPr>
+            <a:picLocks noChangeAspect="1"/>
+          </p:cNvPicPr>
+          <p:nvPr/>
+        </p:nvPicPr>
+        <p:blipFill>
+          <a:blip r:embed="rId5"/>
+          <a:stretch>
+            <a:fillRect/>
+          </a:stretch>
+        </p:blipFill>
+        <p:spPr>
+          <a:xfrm>
+            <a:off x="2077756" y="2603169"/>
+            <a:ext cx="446021" cy="557526"/>
+          </a:xfrm>
+          <a:prstGeom prst="rect">
+            <a:avLst/>
+          </a:prstGeom>
+        </p:spPr>
+      </p:pic>
+      <p:sp>
+        <p:nvSpPr>
+          <p:cNvPr id="21" name="ZoneTexte 20">
+            <a:extLst>
+              <a:ext uri="{FF2B5EF4-FFF2-40B4-BE49-F238E27FC236}">
+                <a16:creationId xmlns:a16="http://schemas.microsoft.com/office/drawing/2014/main" id="{6BD7469E-C3DF-7AAC-D71F-15144654025A}"/>
+              </a:ext>
+            </a:extLst>
+          </p:cNvPr>
+          <p:cNvSpPr txBox="1"/>
+          <p:nvPr/>
+        </p:nvSpPr>
+        <p:spPr>
+          <a:xfrm>
+            <a:off x="2676178" y="2550067"/>
+            <a:ext cx="3777448" cy="892552"/>
+          </a:xfrm>
+          <a:prstGeom prst="rect">
+            <a:avLst/>
+          </a:prstGeom>
+          <a:noFill/>
+        </p:spPr>
+        <p:txBody>
+          <a:bodyPr wrap="square" rtlCol="0">
+            <a:spAutoFit/>
+          </a:bodyPr>
+          <a:lstStyle/>
+          <a:p>
+            <a:r>
+              <a:rPr lang="fr-FR" sz="1600" i="1" dirty="0" err="1">
+                <a:latin typeface="Century Gothic" panose="020B0502020202020204" pitchFamily="34" charset="0"/>
+              </a:rPr>
+              <a:t>Bomb</a:t>
+            </a:r>
+            <a:r>
+              <a:rPr lang="fr-FR" sz="1600" i="1" dirty="0">
+                <a:latin typeface="Century Gothic" panose="020B0502020202020204" pitchFamily="34" charset="0"/>
+              </a:rPr>
+              <a:t>. </a:t>
+            </a:r>
+            <a:br>
+              <a:rPr lang="fr-FR" sz="1600" i="1" dirty="0">
+                <a:latin typeface="Century Gothic" panose="020B0502020202020204" pitchFamily="34" charset="0"/>
+              </a:rPr>
+            </a:br>
+            <a:r>
+              <a:rPr lang="en-US" sz="1200" i="1" dirty="0">
+                <a:latin typeface="Century Gothic" panose="020B0502020202020204" pitchFamily="34" charset="0"/>
+              </a:rPr>
+              <a:t>Stick to a wall and press FIRE. </a:t>
+            </a:r>
+            <a:br>
+              <a:rPr lang="en-US" sz="1200" i="1" dirty="0">
+                <a:latin typeface="Century Gothic" panose="020B0502020202020204" pitchFamily="34" charset="0"/>
+              </a:rPr>
+            </a:br>
+            <a:r>
+              <a:rPr lang="en-US" sz="1200" i="1" dirty="0">
+                <a:latin typeface="Century Gothic" panose="020B0502020202020204" pitchFamily="34" charset="0"/>
+              </a:rPr>
+              <a:t>All the walls around </a:t>
+            </a:r>
+            <a:r>
+              <a:rPr lang="en-US" sz="1200" i="1" dirty="0" err="1">
+                <a:latin typeface="Century Gothic" panose="020B0502020202020204" pitchFamily="34" charset="0"/>
+              </a:rPr>
+              <a:t>Mabool</a:t>
+            </a:r>
+            <a:r>
+              <a:rPr lang="en-US" sz="1200" i="1" dirty="0">
+                <a:latin typeface="Century Gothic" panose="020B0502020202020204" pitchFamily="34" charset="0"/>
+              </a:rPr>
+              <a:t> will be destroyed.
+</a:t>
+            </a:r>
+            <a:endParaRPr lang="fr-FR" sz="1200" i="1" dirty="0">
+              <a:latin typeface="Century Gothic" panose="020B0502020202020204" pitchFamily="34" charset="0"/>
+            </a:endParaRPr>
+          </a:p>
+        </p:txBody>
+      </p:sp>
+      <p:pic>
+        <p:nvPicPr>
+          <p:cNvPr id="23" name="Image 22">
+            <a:extLst>
+              <a:ext uri="{FF2B5EF4-FFF2-40B4-BE49-F238E27FC236}">
+                <a16:creationId xmlns:a16="http://schemas.microsoft.com/office/drawing/2014/main" id="{E9377A75-AB99-3685-716B-2A39CEA12C06}"/>
+              </a:ext>
+            </a:extLst>
+          </p:cNvPr>
+          <p:cNvPicPr>
+            <a:picLocks noChangeAspect="1"/>
+          </p:cNvPicPr>
+          <p:nvPr/>
+        </p:nvPicPr>
+        <p:blipFill>
+          <a:blip r:embed="rId6"/>
+          <a:stretch>
+            <a:fillRect/>
+          </a:stretch>
+        </p:blipFill>
+        <p:spPr>
+          <a:xfrm>
+            <a:off x="2049881" y="3351657"/>
+            <a:ext cx="473896" cy="562751"/>
+          </a:xfrm>
+          <a:prstGeom prst="rect">
+            <a:avLst/>
+          </a:prstGeom>
+        </p:spPr>
+      </p:pic>
+      <p:sp>
+        <p:nvSpPr>
+          <p:cNvPr id="25" name="ZoneTexte 24">
+            <a:extLst>
+              <a:ext uri="{FF2B5EF4-FFF2-40B4-BE49-F238E27FC236}">
+                <a16:creationId xmlns:a16="http://schemas.microsoft.com/office/drawing/2014/main" id="{98B7D1CB-0EF6-0FA7-6AEE-C20424DACBAA}"/>
+              </a:ext>
+            </a:extLst>
+          </p:cNvPr>
+          <p:cNvSpPr txBox="1"/>
+          <p:nvPr/>
+        </p:nvSpPr>
+        <p:spPr>
+          <a:xfrm>
+            <a:off x="2676178" y="3327234"/>
+            <a:ext cx="3777448" cy="707886"/>
+          </a:xfrm>
+          <a:prstGeom prst="rect">
+            <a:avLst/>
+          </a:prstGeom>
+          <a:noFill/>
+        </p:spPr>
+        <p:txBody>
+          <a:bodyPr wrap="square" rtlCol="0">
+            <a:spAutoFit/>
+          </a:bodyPr>
+          <a:lstStyle/>
+          <a:p>
+            <a:r>
+              <a:rPr lang="fr-FR" sz="1600" i="1" dirty="0">
+                <a:latin typeface="Century Gothic" panose="020B0502020202020204" pitchFamily="34" charset="0"/>
+              </a:rPr>
+              <a:t>Exit </a:t>
+            </a:r>
+            <a:r>
+              <a:rPr lang="fr-FR" sz="1600" i="1" dirty="0" err="1">
+                <a:latin typeface="Century Gothic" panose="020B0502020202020204" pitchFamily="34" charset="0"/>
+              </a:rPr>
+              <a:t>door</a:t>
+            </a:r>
+            <a:r>
+              <a:rPr lang="fr-FR" sz="1600" i="1" dirty="0">
+                <a:latin typeface="Century Gothic" panose="020B0502020202020204" pitchFamily="34" charset="0"/>
+              </a:rPr>
+              <a:t>. </a:t>
+            </a:r>
+            <a:br>
+              <a:rPr lang="fr-FR" sz="1600" i="1" dirty="0">
+                <a:latin typeface="Century Gothic" panose="020B0502020202020204" pitchFamily="34" charset="0"/>
+              </a:rPr>
+            </a:br>
+            <a:r>
+              <a:rPr lang="en-US" sz="1200" i="1" dirty="0">
+                <a:latin typeface="Century Gothic" panose="020B0502020202020204" pitchFamily="34" charset="0"/>
+              </a:rPr>
+              <a:t>It will only open if </a:t>
+            </a:r>
+            <a:r>
+              <a:rPr lang="en-US" sz="1200" i="1" dirty="0" err="1">
+                <a:latin typeface="Century Gothic" panose="020B0502020202020204" pitchFamily="34" charset="0"/>
+              </a:rPr>
+              <a:t>Mabool</a:t>
+            </a:r>
+            <a:r>
+              <a:rPr lang="en-US" sz="1200" i="1" dirty="0">
+                <a:latin typeface="Century Gothic" panose="020B0502020202020204" pitchFamily="34" charset="0"/>
+              </a:rPr>
+              <a:t> has picked up all the stars and the key of each room.</a:t>
+            </a:r>
+            <a:endParaRPr lang="fr-FR" sz="1200" i="1" dirty="0">
+              <a:latin typeface="Century Gothic" panose="020B0502020202020204" pitchFamily="34" charset="0"/>
+            </a:endParaRPr>
+          </a:p>
+        </p:txBody>
+      </p:sp>
+      <p:pic>
+        <p:nvPicPr>
+          <p:cNvPr id="27" name="Image 26">
+            <a:extLst>
+              <a:ext uri="{FF2B5EF4-FFF2-40B4-BE49-F238E27FC236}">
+                <a16:creationId xmlns:a16="http://schemas.microsoft.com/office/drawing/2014/main" id="{98FF5E76-4F3C-484A-4D8B-87B045DC452C}"/>
+              </a:ext>
+            </a:extLst>
+          </p:cNvPr>
+          <p:cNvPicPr>
+            <a:picLocks noChangeAspect="1"/>
+          </p:cNvPicPr>
+          <p:nvPr/>
+        </p:nvPicPr>
+        <p:blipFill>
+          <a:blip r:embed="rId7"/>
+          <a:stretch>
+            <a:fillRect/>
+          </a:stretch>
+        </p:blipFill>
+        <p:spPr>
+          <a:xfrm>
+            <a:off x="2049882" y="4061968"/>
+            <a:ext cx="473895" cy="557524"/>
+          </a:xfrm>
+          <a:prstGeom prst="rect">
+            <a:avLst/>
+          </a:prstGeom>
+        </p:spPr>
+      </p:pic>
+      <p:sp>
+        <p:nvSpPr>
+          <p:cNvPr id="28" name="ZoneTexte 27">
+            <a:extLst>
+              <a:ext uri="{FF2B5EF4-FFF2-40B4-BE49-F238E27FC236}">
+                <a16:creationId xmlns:a16="http://schemas.microsoft.com/office/drawing/2014/main" id="{9AA3E2BF-B29E-49FF-3CC9-8E6964C56505}"/>
+              </a:ext>
+            </a:extLst>
+          </p:cNvPr>
+          <p:cNvSpPr txBox="1"/>
+          <p:nvPr/>
+        </p:nvSpPr>
+        <p:spPr>
+          <a:xfrm>
+            <a:off x="2676178" y="4006813"/>
+            <a:ext cx="3777448" cy="523220"/>
+          </a:xfrm>
+          <a:prstGeom prst="rect">
+            <a:avLst/>
+          </a:prstGeom>
+          <a:noFill/>
+        </p:spPr>
+        <p:txBody>
+          <a:bodyPr wrap="square" rtlCol="0">
+            <a:spAutoFit/>
+          </a:bodyPr>
+          <a:lstStyle/>
+          <a:p>
+            <a:r>
+              <a:rPr lang="fr-FR" sz="1600" i="1" dirty="0" err="1">
+                <a:latin typeface="Century Gothic" panose="020B0502020202020204" pitchFamily="34" charset="0"/>
+              </a:rPr>
+              <a:t>Elevator</a:t>
+            </a:r>
+            <a:r>
+              <a:rPr lang="fr-FR" sz="1600" i="1" dirty="0">
+                <a:latin typeface="Century Gothic" panose="020B0502020202020204" pitchFamily="34" charset="0"/>
+              </a:rPr>
+              <a:t>. </a:t>
+            </a:r>
+            <a:br>
+              <a:rPr lang="fr-FR" sz="1600" i="1" dirty="0">
+                <a:latin typeface="Century Gothic" panose="020B0502020202020204" pitchFamily="34" charset="0"/>
+              </a:rPr>
+            </a:br>
+            <a:r>
+              <a:rPr lang="en-US" sz="1200" i="1" dirty="0">
+                <a:latin typeface="Century Gothic" panose="020B0502020202020204" pitchFamily="34" charset="0"/>
+              </a:rPr>
+              <a:t>Allows </a:t>
+            </a:r>
+            <a:r>
+              <a:rPr lang="en-US" sz="1200" i="1" dirty="0" err="1">
+                <a:latin typeface="Century Gothic" panose="020B0502020202020204" pitchFamily="34" charset="0"/>
+              </a:rPr>
+              <a:t>Mabool</a:t>
+            </a:r>
+            <a:r>
+              <a:rPr lang="en-US" sz="1200" i="1" dirty="0">
+                <a:latin typeface="Century Gothic" panose="020B0502020202020204" pitchFamily="34" charset="0"/>
+              </a:rPr>
+              <a:t> to move above the void.</a:t>
+            </a:r>
+            <a:endParaRPr lang="fr-FR" sz="1200" i="1" dirty="0">
+              <a:latin typeface="Century Gothic" panose="020B0502020202020204" pitchFamily="34" charset="0"/>
+            </a:endParaRPr>
+          </a:p>
+        </p:txBody>
+      </p:sp>
+      <p:pic>
+        <p:nvPicPr>
+          <p:cNvPr id="30" name="Image 29">
+            <a:extLst>
+              <a:ext uri="{FF2B5EF4-FFF2-40B4-BE49-F238E27FC236}">
+                <a16:creationId xmlns:a16="http://schemas.microsoft.com/office/drawing/2014/main" id="{914C1B42-EDC1-6415-4E95-27B5183E2D3F}"/>
+              </a:ext>
+            </a:extLst>
+          </p:cNvPr>
+          <p:cNvPicPr>
+            <a:picLocks noChangeAspect="1"/>
+          </p:cNvPicPr>
+          <p:nvPr/>
+        </p:nvPicPr>
+        <p:blipFill>
+          <a:blip r:embed="rId8"/>
+          <a:stretch>
+            <a:fillRect/>
+          </a:stretch>
+        </p:blipFill>
+        <p:spPr>
+          <a:xfrm>
+            <a:off x="2049882" y="4788831"/>
+            <a:ext cx="473896" cy="557524"/>
+          </a:xfrm>
+          <a:prstGeom prst="rect">
+            <a:avLst/>
+          </a:prstGeom>
+        </p:spPr>
+      </p:pic>
+      <p:sp>
+        <p:nvSpPr>
+          <p:cNvPr id="31" name="ZoneTexte 30">
+            <a:extLst>
+              <a:ext uri="{FF2B5EF4-FFF2-40B4-BE49-F238E27FC236}">
+                <a16:creationId xmlns:a16="http://schemas.microsoft.com/office/drawing/2014/main" id="{B5538699-9762-BFBB-5B90-6A7347CE8CF6}"/>
+              </a:ext>
+            </a:extLst>
+          </p:cNvPr>
+          <p:cNvSpPr txBox="1"/>
+          <p:nvPr/>
+        </p:nvSpPr>
+        <p:spPr>
+          <a:xfrm>
+            <a:off x="2676178" y="4754590"/>
+            <a:ext cx="3777448" cy="707886"/>
+          </a:xfrm>
+          <a:prstGeom prst="rect">
+            <a:avLst/>
+          </a:prstGeom>
+          <a:noFill/>
+        </p:spPr>
+        <p:txBody>
+          <a:bodyPr wrap="square" rtlCol="0">
+            <a:spAutoFit/>
+          </a:bodyPr>
+          <a:lstStyle/>
+          <a:p>
+            <a:r>
+              <a:rPr lang="fr-FR" sz="1600" i="1" dirty="0" err="1">
+                <a:latin typeface="Century Gothic" panose="020B0502020202020204" pitchFamily="34" charset="0"/>
+              </a:rPr>
+              <a:t>Teleporter</a:t>
+            </a:r>
+            <a:r>
+              <a:rPr lang="fr-FR" sz="1600" i="1" dirty="0">
+                <a:latin typeface="Century Gothic" panose="020B0502020202020204" pitchFamily="34" charset="0"/>
+              </a:rPr>
+              <a:t>. </a:t>
+            </a:r>
+            <a:br>
+              <a:rPr lang="fr-FR" sz="1600" i="1" dirty="0">
+                <a:latin typeface="Century Gothic" panose="020B0502020202020204" pitchFamily="34" charset="0"/>
+              </a:rPr>
+            </a:br>
+            <a:r>
+              <a:rPr lang="en-US" sz="1200" i="1" dirty="0">
+                <a:latin typeface="Century Gothic" panose="020B0502020202020204" pitchFamily="34" charset="0"/>
+              </a:rPr>
+              <a:t>Allows </a:t>
+            </a:r>
+            <a:r>
+              <a:rPr lang="en-US" sz="1200" i="1" dirty="0" err="1">
+                <a:latin typeface="Century Gothic" panose="020B0502020202020204" pitchFamily="34" charset="0"/>
+              </a:rPr>
+              <a:t>Mabool</a:t>
+            </a:r>
+            <a:r>
+              <a:rPr lang="en-US" sz="1200" i="1" dirty="0">
+                <a:latin typeface="Century Gothic" panose="020B0502020202020204" pitchFamily="34" charset="0"/>
+              </a:rPr>
+              <a:t> to move to another teleporter present in the room.</a:t>
+            </a:r>
+            <a:endParaRPr lang="fr-FR" sz="1200" i="1" dirty="0">
+              <a:latin typeface="Century Gothic" panose="020B0502020202020204" pitchFamily="34" charset="0"/>
+            </a:endParaRPr>
+          </a:p>
+        </p:txBody>
+      </p:sp>
+      <p:pic>
+        <p:nvPicPr>
+          <p:cNvPr id="2" name="Image 1">
+            <a:extLst>
+              <a:ext uri="{FF2B5EF4-FFF2-40B4-BE49-F238E27FC236}">
+                <a16:creationId xmlns:a16="http://schemas.microsoft.com/office/drawing/2014/main" id="{ABADC6C4-32F8-4AED-0D12-6BD8BA133C76}"/>
+              </a:ext>
+            </a:extLst>
+          </p:cNvPr>
+          <p:cNvPicPr>
+            <a:picLocks noChangeAspect="1"/>
+          </p:cNvPicPr>
+          <p:nvPr/>
+        </p:nvPicPr>
+        <p:blipFill>
+          <a:blip r:embed="rId9"/>
+          <a:stretch>
+            <a:fillRect/>
+          </a:stretch>
+        </p:blipFill>
+        <p:spPr>
+          <a:xfrm>
+            <a:off x="2722159" y="6227574"/>
+            <a:ext cx="2027756" cy="509192"/>
+          </a:xfrm>
+          <a:prstGeom prst="rect">
+            <a:avLst/>
+          </a:prstGeom>
+        </p:spPr>
+      </p:pic>
+    </p:spTree>
+    <p:extLst>
+      <p:ext uri="{BB962C8B-B14F-4D97-AF65-F5344CB8AC3E}">
+        <p14:creationId xmlns:p14="http://schemas.microsoft.com/office/powerpoint/2010/main" val="1795726103"/>
+      </p:ext>
+    </p:extLst>
+  </p:cSld>
+  <p:clrMapOvr>
+    <a:masterClrMapping/>
+  </p:clrMapOvr>
+</p:sld>
+</file>
+
+<file path=ppt/slides/slide11.xml><?xml version="1.0" encoding="utf-8"?>
+<p:sld xmlns:a="http://schemas.openxmlformats.org/drawingml/2006/main" xmlns:r="http://schemas.openxmlformats.org/officeDocument/2006/relationships" xmlns:p="http://schemas.openxmlformats.org/presentationml/2006/main">
+  <p:cSld>
+    <p:spTree>
+      <p:nvGrpSpPr>
+        <p:cNvPr id="1" name=""/>
+        <p:cNvGrpSpPr/>
+        <p:nvPr/>
+      </p:nvGrpSpPr>
+      <p:grpSpPr>
+        <a:xfrm>
+          <a:off x="0" y="0"/>
+          <a:ext cx="0" cy="0"/>
+          <a:chOff x="0" y="0"/>
+          <a:chExt cx="0" cy="0"/>
+        </a:xfrm>
+      </p:grpSpPr>
+      <p:grpSp>
+        <p:nvGrpSpPr>
+          <p:cNvPr id="4" name="Groupe 3">
+            <a:extLst>
+              <a:ext uri="{FF2B5EF4-FFF2-40B4-BE49-F238E27FC236}">
+                <a16:creationId xmlns:a16="http://schemas.microsoft.com/office/drawing/2014/main" id="{245F472C-B6B9-EBE9-A183-510A380574F9}"/>
+              </a:ext>
+            </a:extLst>
+          </p:cNvPr>
+          <p:cNvGrpSpPr/>
+          <p:nvPr/>
+        </p:nvGrpSpPr>
+        <p:grpSpPr>
+          <a:xfrm>
+            <a:off x="1345018" y="0"/>
+            <a:ext cx="5108609" cy="6853139"/>
+            <a:chOff x="1573618" y="156802"/>
+            <a:chExt cx="5108609" cy="6853139"/>
+          </a:xfrm>
+          <a:solidFill>
+            <a:schemeClr val="bg1"/>
+          </a:solidFill>
+        </p:grpSpPr>
+        <p:sp>
+          <p:nvSpPr>
+            <p:cNvPr id="5" name="Rectangle 4">
+              <a:extLst>
+                <a:ext uri="{FF2B5EF4-FFF2-40B4-BE49-F238E27FC236}">
+                  <a16:creationId xmlns:a16="http://schemas.microsoft.com/office/drawing/2014/main" id="{EA6271CB-7CB1-8AF6-1FA1-E3EF4709453A}"/>
+                </a:ext>
+              </a:extLst>
+            </p:cNvPr>
+            <p:cNvSpPr/>
+            <p:nvPr/>
+          </p:nvSpPr>
+          <p:spPr>
+            <a:xfrm>
+              <a:off x="1573618" y="156802"/>
+              <a:ext cx="5108609" cy="6853139"/>
+            </a:xfrm>
+            <a:prstGeom prst="rect">
+              <a:avLst/>
+            </a:prstGeom>
+            <a:grpFill/>
+            <a:ln>
+              <a:solidFill>
+                <a:schemeClr val="bg1">
+                  <a:lumMod val="85000"/>
+                </a:schemeClr>
+              </a:solidFill>
+            </a:ln>
+          </p:spPr>
+          <p:style>
+            <a:lnRef idx="2">
+              <a:schemeClr val="accent1">
+                <a:shade val="50000"/>
+              </a:schemeClr>
+            </a:lnRef>
+            <a:fillRef idx="1">
+              <a:schemeClr val="accent1"/>
+            </a:fillRef>
+            <a:effectRef idx="0">
+              <a:schemeClr val="accent1"/>
+            </a:effectRef>
+            <a:fontRef idx="minor">
+              <a:schemeClr val="lt1"/>
+            </a:fontRef>
+          </p:style>
+          <p:txBody>
+            <a:bodyPr rtlCol="0" anchor="ctr"/>
+            <a:lstStyle/>
+            <a:p>
+              <a:pPr algn="ctr"/>
+              <a:endParaRPr lang="fr-FR"/>
+            </a:p>
+          </p:txBody>
+        </p:sp>
+        <p:sp>
+          <p:nvSpPr>
+            <p:cNvPr id="9" name="ZoneTexte 8">
+              <a:extLst>
+                <a:ext uri="{FF2B5EF4-FFF2-40B4-BE49-F238E27FC236}">
+                  <a16:creationId xmlns:a16="http://schemas.microsoft.com/office/drawing/2014/main" id="{7BF7CDFD-AAD3-9FA2-5875-D712D95DEF02}"/>
+                </a:ext>
+              </a:extLst>
+            </p:cNvPr>
+            <p:cNvSpPr txBox="1"/>
+            <p:nvPr/>
+          </p:nvSpPr>
+          <p:spPr>
+            <a:xfrm>
+              <a:off x="1641769" y="846207"/>
+              <a:ext cx="5040458" cy="584775"/>
+            </a:xfrm>
+            <a:prstGeom prst="rect">
+              <a:avLst/>
+            </a:prstGeom>
+            <a:noFill/>
+          </p:spPr>
+          <p:txBody>
+            <a:bodyPr wrap="square" rtlCol="0">
+              <a:spAutoFit/>
+            </a:bodyPr>
+            <a:lstStyle/>
+            <a:p>
+              <a:r>
+                <a:rPr lang="fr-FR" sz="1600" b="1" dirty="0">
+                  <a:latin typeface="Century Gothic" panose="020B0502020202020204" pitchFamily="34" charset="0"/>
+                </a:rPr>
+                <a:t>OBJECTS AND TRAPS
+</a:t>
+              </a:r>
+            </a:p>
+          </p:txBody>
+        </p:sp>
+      </p:grpSp>
+      <p:cxnSp>
+        <p:nvCxnSpPr>
+          <p:cNvPr id="15" name="Connecteur droit 14">
+            <a:extLst>
+              <a:ext uri="{FF2B5EF4-FFF2-40B4-BE49-F238E27FC236}">
+                <a16:creationId xmlns:a16="http://schemas.microsoft.com/office/drawing/2014/main" id="{2C3CD1F2-CFD8-B187-5787-0AFC0DF5C0B9}"/>
+              </a:ext>
+            </a:extLst>
+          </p:cNvPr>
+          <p:cNvCxnSpPr/>
+          <p:nvPr/>
+        </p:nvCxnSpPr>
+        <p:spPr>
+          <a:xfrm>
+            <a:off x="1345018" y="6150279"/>
+            <a:ext cx="5108609" cy="0"/>
+          </a:xfrm>
+          <a:prstGeom prst="line">
+            <a:avLst/>
+          </a:prstGeom>
+          <a:ln w="38100">
+            <a:solidFill>
+              <a:schemeClr val="tx1"/>
+            </a:solidFill>
+          </a:ln>
+        </p:spPr>
+        <p:style>
+          <a:lnRef idx="1">
+            <a:schemeClr val="accent1"/>
+          </a:lnRef>
+          <a:fillRef idx="0">
+            <a:schemeClr val="accent1"/>
+          </a:fillRef>
+          <a:effectRef idx="0">
+            <a:schemeClr val="accent1"/>
+          </a:effectRef>
+          <a:fontRef idx="minor">
+            <a:schemeClr val="tx1"/>
+          </a:fontRef>
+        </p:style>
+      </p:cxnSp>
+      <p:sp>
+        <p:nvSpPr>
+          <p:cNvPr id="10" name="ZoneTexte 9">
+            <a:extLst>
+              <a:ext uri="{FF2B5EF4-FFF2-40B4-BE49-F238E27FC236}">
+                <a16:creationId xmlns:a16="http://schemas.microsoft.com/office/drawing/2014/main" id="{FE24B69D-C1A6-58C6-D56D-D2BD1D5CD9DC}"/>
+              </a:ext>
+            </a:extLst>
+          </p:cNvPr>
+          <p:cNvSpPr txBox="1"/>
+          <p:nvPr/>
+        </p:nvSpPr>
+        <p:spPr>
+          <a:xfrm>
+            <a:off x="1345018" y="140102"/>
+            <a:ext cx="5108608" cy="369332"/>
+          </a:xfrm>
+          <a:prstGeom prst="rect">
+            <a:avLst/>
+          </a:prstGeom>
+          <a:solidFill>
+            <a:schemeClr val="tx1"/>
+          </a:solidFill>
+        </p:spPr>
+        <p:txBody>
+          <a:bodyPr wrap="square" rtlCol="0">
+            <a:spAutoFit/>
+          </a:bodyPr>
+          <a:lstStyle/>
+          <a:p>
+            <a:pPr algn="r"/>
+            <a:r>
+              <a:rPr lang="fr-FR" b="1" dirty="0">
+                <a:solidFill>
+                  <a:schemeClr val="bg1"/>
+                </a:solidFill>
+                <a:latin typeface="Century Gothic" panose="020B0502020202020204" pitchFamily="34" charset="0"/>
+              </a:rPr>
+              <a:t>English</a:t>
+            </a:r>
+          </a:p>
+        </p:txBody>
+      </p:sp>
       <p:pic>
         <p:nvPicPr>
           <p:cNvPr id="17" name="Image 16">
@@ -5928,7 +6809,7 @@
 </p:sld>
 </file>
 
-<file path=ppt/slides/slide11.xml><?xml version="1.0" encoding="utf-8"?>
+<file path=ppt/slides/slide12.xml><?xml version="1.0" encoding="utf-8"?>
 <p:sld xmlns:a="http://schemas.openxmlformats.org/drawingml/2006/main" xmlns:r="http://schemas.openxmlformats.org/officeDocument/2006/relationships" xmlns:p="http://schemas.openxmlformats.org/presentationml/2006/main">
   <p:cSld>
     <p:spTree>
@@ -6197,7 +7078,7 @@
 </p:sld>
 </file>
 
-<file path=ppt/slides/slide12.xml><?xml version="1.0" encoding="utf-8"?>
+<file path=ppt/slides/slide13.xml><?xml version="1.0" encoding="utf-8"?>
 <p:sld xmlns:a="http://schemas.openxmlformats.org/drawingml/2006/main" xmlns:r="http://schemas.openxmlformats.org/officeDocument/2006/relationships" xmlns:p="http://schemas.openxmlformats.org/presentationml/2006/main">
   <p:cSld>
     <p:spTree>
@@ -6343,7 +7224,7 @@
                 <a:rPr lang="fr-FR" sz="1600" dirty="0">
                   <a:latin typeface="Century Gothic" panose="020B0502020202020204" pitchFamily="34" charset="0"/>
                 </a:rPr>
-                <a:t>, aventurier rondouillard, se retrouve enfermé dans un château obscure. Afin de s’échapper, il devra sortir de chacune des salles de ce lugubre bâtiment, en ramassant toutes les étoiles et clé présentes, qui ouvriront la porte de sortie.</a:t>
+                <a:t>, aventurier rondouillard, se retrouve enfermé dans un château obscur. Afin de s’échapper, il devra sortir de chacune des salles de ce lugubre bâtiment, en ramassant toutes les étoiles et clés présentes, qui ouvriront la porte de sortie.</a:t>
               </a:r>
             </a:p>
             <a:p>
@@ -6533,7 +7414,7 @@
 </p:sld>
 </file>
 
-<file path=ppt/slides/slide13.xml><?xml version="1.0" encoding="utf-8"?>
+<file path=ppt/slides/slide14.xml><?xml version="1.0" encoding="utf-8"?>
 <p:sld xmlns:a="http://schemas.openxmlformats.org/drawingml/2006/main" xmlns:r="http://schemas.openxmlformats.org/officeDocument/2006/relationships" xmlns:p="http://schemas.openxmlformats.org/presentationml/2006/main">
   <p:cSld>
     <p:spTree>
@@ -6963,7 +7844,7 @@
 </p:sld>
 </file>
 
-<file path=ppt/slides/slide14.xml><?xml version="1.0" encoding="utf-8"?>
+<file path=ppt/slides/slide15.xml><?xml version="1.0" encoding="utf-8"?>
 <p:sld xmlns:a="http://schemas.openxmlformats.org/drawingml/2006/main" xmlns:r="http://schemas.openxmlformats.org/officeDocument/2006/relationships" xmlns:p="http://schemas.openxmlformats.org/presentationml/2006/main">
   <p:cSld>
     <p:spTree>
@@ -7390,7 +8271,7 @@
 </p:sld>
 </file>
 
-<file path=ppt/slides/slide15.xml><?xml version="1.0" encoding="utf-8"?>
+<file path=ppt/slides/slide16.xml><?xml version="1.0" encoding="utf-8"?>
 <p:sld xmlns:a="http://schemas.openxmlformats.org/drawingml/2006/main" xmlns:r="http://schemas.openxmlformats.org/officeDocument/2006/relationships" xmlns:p="http://schemas.openxmlformats.org/presentationml/2006/main">
   <p:cSld>
     <p:spTree>
@@ -8196,7 +9077,7 @@
 </p:sld>
 </file>
 
-<file path=ppt/slides/slide16.xml><?xml version="1.0" encoding="utf-8"?>
+<file path=ppt/slides/slide17.xml><?xml version="1.0" encoding="utf-8"?>
 <p:sld xmlns:a="http://schemas.openxmlformats.org/drawingml/2006/main" xmlns:r="http://schemas.openxmlformats.org/officeDocument/2006/relationships" xmlns:p="http://schemas.openxmlformats.org/presentationml/2006/main">
   <p:cSld>
     <p:spTree>
@@ -8737,7 +9618,7 @@
 </p:sld>
 </file>
 
-<file path=ppt/slides/slide17.xml><?xml version="1.0" encoding="utf-8"?>
+<file path=ppt/slides/slide18.xml><?xml version="1.0" encoding="utf-8"?>
 <p:sld xmlns:a="http://schemas.openxmlformats.org/drawingml/2006/main" xmlns:r="http://schemas.openxmlformats.org/officeDocument/2006/relationships" xmlns:p="http://schemas.openxmlformats.org/presentationml/2006/main">
   <p:cSld>
     <p:spTree>
@@ -9179,7 +10060,7 @@
                   </a:schemeClr>
                 </a:solidFill>
               </a:rPr>
-              <a:t>, aventurier rondouillard, se retrouve enfermé dans un château obscure. Afin de s’échapper, il devra sortir de chacune des salles de ce lugubre bâtiment, en ramassant toutes les étoiles et clé présentes, qui ouvriront la porte de sortie.</a:t>
+              <a:t>, aventurier rondouillard, se retrouve enfermé dans un château obscur. Afin de s’échapper, il devra sortir de chacune des salles de ce lugubre bâtiment, en ramassant toutes les étoiles et clés présentes, qui ouvriront la porte de sortie.</a:t>
             </a:r>
           </a:p>
         </p:txBody>
@@ -9725,7 +10606,7 @@
 </p:sld>
 </file>
 
-<file path=ppt/slides/slide18.xml><?xml version="1.0" encoding="utf-8"?>
+<file path=ppt/slides/slide19.xml><?xml version="1.0" encoding="utf-8"?>
 <p:sld xmlns:a="http://schemas.openxmlformats.org/drawingml/2006/main" xmlns:r="http://schemas.openxmlformats.org/officeDocument/2006/relationships" xmlns:p="http://schemas.openxmlformats.org/presentationml/2006/main">
   <p:cSld>
     <p:spTree>
@@ -14895,7 +15776,476 @@
 </p:sld>
 </file>
 
-<file path=ppt/slides/slide19.xml><?xml version="1.0" encoding="utf-8"?>
+<file path=ppt/slides/slide2.xml><?xml version="1.0" encoding="utf-8"?>
+<p:sld xmlns:a="http://schemas.openxmlformats.org/drawingml/2006/main" xmlns:r="http://schemas.openxmlformats.org/officeDocument/2006/relationships" xmlns:p="http://schemas.openxmlformats.org/presentationml/2006/main">
+  <p:cSld>
+    <p:spTree>
+      <p:nvGrpSpPr>
+        <p:cNvPr id="1" name=""/>
+        <p:cNvGrpSpPr/>
+        <p:nvPr/>
+      </p:nvGrpSpPr>
+      <p:grpSpPr>
+        <a:xfrm>
+          <a:off x="0" y="0"/>
+          <a:ext cx="0" cy="0"/>
+          <a:chOff x="0" y="0"/>
+          <a:chExt cx="0" cy="0"/>
+        </a:xfrm>
+      </p:grpSpPr>
+      <p:pic>
+        <p:nvPicPr>
+          <p:cNvPr id="1026" name="Picture 2">
+            <a:extLst>
+              <a:ext uri="{FF2B5EF4-FFF2-40B4-BE49-F238E27FC236}">
+                <a16:creationId xmlns:a16="http://schemas.microsoft.com/office/drawing/2014/main" id="{8096EDF5-A031-52C5-FB8E-D81632735F26}"/>
+              </a:ext>
+            </a:extLst>
+          </p:cNvPr>
+          <p:cNvPicPr>
+            <a:picLocks noChangeAspect="1" noChangeArrowheads="1"/>
+          </p:cNvPicPr>
+          <p:nvPr/>
+        </p:nvPicPr>
+        <p:blipFill rotWithShape="1">
+          <a:blip r:embed="rId2">
+            <a:extLst>
+              <a:ext uri="{28A0092B-C50C-407E-A947-70E740481C1C}">
+                <a14:useLocalDpi xmlns:a14="http://schemas.microsoft.com/office/drawing/2010/main" val="0"/>
+              </a:ext>
+            </a:extLst>
+          </a:blip>
+          <a:srcRect l="9566" t="23675" r="9132" b="24419"/>
+          <a:stretch/>
+        </p:blipFill>
+        <p:spPr bwMode="auto">
+          <a:xfrm>
+            <a:off x="2391439" y="1425942"/>
+            <a:ext cx="7409121" cy="4730309"/>
+          </a:xfrm>
+          <a:prstGeom prst="rect">
+            <a:avLst/>
+          </a:prstGeom>
+          <a:noFill/>
+          <a:extLst>
+            <a:ext uri="{909E8E84-426E-40DD-AFC4-6F175D3DCCD1}">
+              <a14:hiddenFill xmlns:a14="http://schemas.microsoft.com/office/drawing/2010/main">
+                <a:solidFill>
+                  <a:srgbClr val="FFFFFF"/>
+                </a:solidFill>
+              </a14:hiddenFill>
+            </a:ext>
+          </a:extLst>
+        </p:spPr>
+      </p:pic>
+      <p:sp>
+        <p:nvSpPr>
+          <p:cNvPr id="16" name="Forme libre : forme 15">
+            <a:extLst>
+              <a:ext uri="{FF2B5EF4-FFF2-40B4-BE49-F238E27FC236}">
+                <a16:creationId xmlns:a16="http://schemas.microsoft.com/office/drawing/2014/main" id="{D467B6A8-93B1-BAF7-8F0F-F4D8390F996B}"/>
+              </a:ext>
+            </a:extLst>
+          </p:cNvPr>
+          <p:cNvSpPr/>
+          <p:nvPr/>
+        </p:nvSpPr>
+        <p:spPr>
+          <a:xfrm>
+            <a:off x="2803449" y="1835291"/>
+            <a:ext cx="6521303" cy="2966489"/>
+          </a:xfrm>
+          <a:custGeom>
+            <a:avLst/>
+            <a:gdLst>
+              <a:gd name="connsiteX0" fmla="*/ 1680242 w 6521303"/>
+              <a:gd name="connsiteY0" fmla="*/ 1073895 h 2966489"/>
+              <a:gd name="connsiteX1" fmla="*/ 1077435 w 6521303"/>
+              <a:gd name="connsiteY1" fmla="*/ 1676702 h 2966489"/>
+              <a:gd name="connsiteX2" fmla="*/ 1680242 w 6521303"/>
+              <a:gd name="connsiteY2" fmla="*/ 2279509 h 2966489"/>
+              <a:gd name="connsiteX3" fmla="*/ 4887139 w 6521303"/>
+              <a:gd name="connsiteY3" fmla="*/ 2279509 h 2966489"/>
+              <a:gd name="connsiteX4" fmla="*/ 5489946 w 6521303"/>
+              <a:gd name="connsiteY4" fmla="*/ 1676702 h 2966489"/>
+              <a:gd name="connsiteX5" fmla="*/ 4887139 w 6521303"/>
+              <a:gd name="connsiteY5" fmla="*/ 1073895 h 2966489"/>
+              <a:gd name="connsiteX6" fmla="*/ 350878 w 6521303"/>
+              <a:gd name="connsiteY6" fmla="*/ 0 h 2966489"/>
+              <a:gd name="connsiteX7" fmla="*/ 6170426 w 6521303"/>
+              <a:gd name="connsiteY7" fmla="*/ 0 h 2966489"/>
+              <a:gd name="connsiteX8" fmla="*/ 6521303 w 6521303"/>
+              <a:gd name="connsiteY8" fmla="*/ 350877 h 2966489"/>
+              <a:gd name="connsiteX9" fmla="*/ 6521303 w 6521303"/>
+              <a:gd name="connsiteY9" fmla="*/ 701754 h 2966489"/>
+              <a:gd name="connsiteX10" fmla="*/ 6521302 w 6521303"/>
+              <a:gd name="connsiteY10" fmla="*/ 701754 h 2966489"/>
+              <a:gd name="connsiteX11" fmla="*/ 6521302 w 6521303"/>
+              <a:gd name="connsiteY11" fmla="*/ 2732565 h 2966489"/>
+              <a:gd name="connsiteX12" fmla="*/ 6287378 w 6521303"/>
+              <a:gd name="connsiteY12" fmla="*/ 2966489 h 2966489"/>
+              <a:gd name="connsiteX13" fmla="*/ 233924 w 6521303"/>
+              <a:gd name="connsiteY13" fmla="*/ 2966489 h 2966489"/>
+              <a:gd name="connsiteX14" fmla="*/ 0 w 6521303"/>
+              <a:gd name="connsiteY14" fmla="*/ 2732565 h 2966489"/>
+              <a:gd name="connsiteX15" fmla="*/ 0 w 6521303"/>
+              <a:gd name="connsiteY15" fmla="*/ 701754 h 2966489"/>
+              <a:gd name="connsiteX16" fmla="*/ 1 w 6521303"/>
+              <a:gd name="connsiteY16" fmla="*/ 701754 h 2966489"/>
+              <a:gd name="connsiteX17" fmla="*/ 1 w 6521303"/>
+              <a:gd name="connsiteY17" fmla="*/ 350877 h 2966489"/>
+            </a:gdLst>
+            <a:ahLst/>
+            <a:cxnLst>
+              <a:cxn ang="0">
+                <a:pos x="connsiteX0" y="connsiteY0"/>
+              </a:cxn>
+              <a:cxn ang="0">
+                <a:pos x="connsiteX1" y="connsiteY1"/>
+              </a:cxn>
+              <a:cxn ang="0">
+                <a:pos x="connsiteX2" y="connsiteY2"/>
+              </a:cxn>
+              <a:cxn ang="0">
+                <a:pos x="connsiteX3" y="connsiteY3"/>
+              </a:cxn>
+              <a:cxn ang="0">
+                <a:pos x="connsiteX4" y="connsiteY4"/>
+              </a:cxn>
+              <a:cxn ang="0">
+                <a:pos x="connsiteX5" y="connsiteY5"/>
+              </a:cxn>
+              <a:cxn ang="0">
+                <a:pos x="connsiteX6" y="connsiteY6"/>
+              </a:cxn>
+              <a:cxn ang="0">
+                <a:pos x="connsiteX7" y="connsiteY7"/>
+              </a:cxn>
+              <a:cxn ang="0">
+                <a:pos x="connsiteX8" y="connsiteY8"/>
+              </a:cxn>
+              <a:cxn ang="0">
+                <a:pos x="connsiteX9" y="connsiteY9"/>
+              </a:cxn>
+              <a:cxn ang="0">
+                <a:pos x="connsiteX10" y="connsiteY10"/>
+              </a:cxn>
+              <a:cxn ang="0">
+                <a:pos x="connsiteX11" y="connsiteY11"/>
+              </a:cxn>
+              <a:cxn ang="0">
+                <a:pos x="connsiteX12" y="connsiteY12"/>
+              </a:cxn>
+              <a:cxn ang="0">
+                <a:pos x="connsiteX13" y="connsiteY13"/>
+              </a:cxn>
+              <a:cxn ang="0">
+                <a:pos x="connsiteX14" y="connsiteY14"/>
+              </a:cxn>
+              <a:cxn ang="0">
+                <a:pos x="connsiteX15" y="connsiteY15"/>
+              </a:cxn>
+              <a:cxn ang="0">
+                <a:pos x="connsiteX16" y="connsiteY16"/>
+              </a:cxn>
+              <a:cxn ang="0">
+                <a:pos x="connsiteX17" y="connsiteY17"/>
+              </a:cxn>
+            </a:cxnLst>
+            <a:rect l="l" t="t" r="r" b="b"/>
+            <a:pathLst>
+              <a:path w="6521303" h="2966489">
+                <a:moveTo>
+                  <a:pt x="1680242" y="1073895"/>
+                </a:moveTo>
+                <a:cubicBezTo>
+                  <a:pt x="1347321" y="1073895"/>
+                  <a:pt x="1077435" y="1343781"/>
+                  <a:pt x="1077435" y="1676702"/>
+                </a:cubicBezTo>
+                <a:cubicBezTo>
+                  <a:pt x="1077435" y="2009623"/>
+                  <a:pt x="1347321" y="2279509"/>
+                  <a:pt x="1680242" y="2279509"/>
+                </a:cubicBezTo>
+                <a:lnTo>
+                  <a:pt x="4887139" y="2279509"/>
+                </a:lnTo>
+                <a:cubicBezTo>
+                  <a:pt x="5220060" y="2279509"/>
+                  <a:pt x="5489946" y="2009623"/>
+                  <a:pt x="5489946" y="1676702"/>
+                </a:cubicBezTo>
+                <a:cubicBezTo>
+                  <a:pt x="5489946" y="1343781"/>
+                  <a:pt x="5220060" y="1073895"/>
+                  <a:pt x="4887139" y="1073895"/>
+                </a:cubicBezTo>
+                <a:close/>
+                <a:moveTo>
+                  <a:pt x="350878" y="0"/>
+                </a:moveTo>
+                <a:lnTo>
+                  <a:pt x="6170426" y="0"/>
+                </a:lnTo>
+                <a:lnTo>
+                  <a:pt x="6521303" y="350877"/>
+                </a:lnTo>
+                <a:lnTo>
+                  <a:pt x="6521303" y="701754"/>
+                </a:lnTo>
+                <a:lnTo>
+                  <a:pt x="6521302" y="701754"/>
+                </a:lnTo>
+                <a:lnTo>
+                  <a:pt x="6521302" y="2732565"/>
+                </a:lnTo>
+                <a:cubicBezTo>
+                  <a:pt x="6521302" y="2861758"/>
+                  <a:pt x="6416571" y="2966489"/>
+                  <a:pt x="6287378" y="2966489"/>
+                </a:cubicBezTo>
+                <a:lnTo>
+                  <a:pt x="233924" y="2966489"/>
+                </a:lnTo>
+                <a:cubicBezTo>
+                  <a:pt x="104731" y="2966489"/>
+                  <a:pt x="0" y="2861758"/>
+                  <a:pt x="0" y="2732565"/>
+                </a:cubicBezTo>
+                <a:lnTo>
+                  <a:pt x="0" y="701754"/>
+                </a:lnTo>
+                <a:lnTo>
+                  <a:pt x="1" y="701754"/>
+                </a:lnTo>
+                <a:lnTo>
+                  <a:pt x="1" y="350877"/>
+                </a:lnTo>
+                <a:close/>
+              </a:path>
+            </a:pathLst>
+          </a:custGeom>
+          <a:solidFill>
+            <a:schemeClr val="tx1"/>
+          </a:solidFill>
+          <a:ln>
+            <a:noFill/>
+          </a:ln>
+        </p:spPr>
+        <p:style>
+          <a:lnRef idx="2">
+            <a:schemeClr val="accent1">
+              <a:shade val="50000"/>
+            </a:schemeClr>
+          </a:lnRef>
+          <a:fillRef idx="1">
+            <a:schemeClr val="accent1"/>
+          </a:fillRef>
+          <a:effectRef idx="0">
+            <a:schemeClr val="accent1"/>
+          </a:effectRef>
+          <a:fontRef idx="minor">
+            <a:schemeClr val="lt1"/>
+          </a:fontRef>
+        </p:style>
+        <p:txBody>
+          <a:bodyPr wrap="square" rtlCol="0" anchor="ctr">
+            <a:noAutofit/>
+          </a:bodyPr>
+          <a:lstStyle/>
+          <a:p>
+            <a:pPr algn="ctr"/>
+            <a:endParaRPr lang="fr-FR"/>
+          </a:p>
+        </p:txBody>
+      </p:sp>
+      <p:cxnSp>
+        <p:nvCxnSpPr>
+          <p:cNvPr id="13" name="Connecteur droit 12">
+            <a:extLst>
+              <a:ext uri="{FF2B5EF4-FFF2-40B4-BE49-F238E27FC236}">
+                <a16:creationId xmlns:a16="http://schemas.microsoft.com/office/drawing/2014/main" id="{99F4D875-28F5-E3D8-4DC3-5E62F8B77747}"/>
+              </a:ext>
+            </a:extLst>
+          </p:cNvPr>
+          <p:cNvCxnSpPr>
+            <a:cxnSpLocks/>
+          </p:cNvCxnSpPr>
+          <p:nvPr/>
+        </p:nvCxnSpPr>
+        <p:spPr>
+          <a:xfrm>
+            <a:off x="3189767" y="2374685"/>
+            <a:ext cx="3120654" cy="26496"/>
+          </a:xfrm>
+          <a:prstGeom prst="line">
+            <a:avLst/>
+          </a:prstGeom>
+          <a:ln w="12700">
+            <a:solidFill>
+              <a:schemeClr val="bg1">
+                <a:lumMod val="95000"/>
+              </a:schemeClr>
+            </a:solidFill>
+          </a:ln>
+        </p:spPr>
+        <p:style>
+          <a:lnRef idx="1">
+            <a:schemeClr val="accent1"/>
+          </a:lnRef>
+          <a:fillRef idx="0">
+            <a:schemeClr val="accent1"/>
+          </a:fillRef>
+          <a:effectRef idx="0">
+            <a:schemeClr val="accent1"/>
+          </a:effectRef>
+          <a:fontRef idx="minor">
+            <a:schemeClr val="tx1"/>
+          </a:fontRef>
+        </p:style>
+      </p:cxnSp>
+      <p:sp>
+        <p:nvSpPr>
+          <p:cNvPr id="25" name="ZoneTexte 24">
+            <a:extLst>
+              <a:ext uri="{FF2B5EF4-FFF2-40B4-BE49-F238E27FC236}">
+                <a16:creationId xmlns:a16="http://schemas.microsoft.com/office/drawing/2014/main" id="{B333F463-26DE-4258-1722-44B2E8398823}"/>
+              </a:ext>
+            </a:extLst>
+          </p:cNvPr>
+          <p:cNvSpPr txBox="1"/>
+          <p:nvPr/>
+        </p:nvSpPr>
+        <p:spPr>
+          <a:xfrm>
+            <a:off x="3099610" y="2016122"/>
+            <a:ext cx="2267475" cy="338554"/>
+          </a:xfrm>
+          <a:prstGeom prst="rect">
+            <a:avLst/>
+          </a:prstGeom>
+          <a:noFill/>
+        </p:spPr>
+        <p:txBody>
+          <a:bodyPr wrap="square" rtlCol="0">
+            <a:spAutoFit/>
+          </a:bodyPr>
+          <a:lstStyle/>
+          <a:p>
+            <a:r>
+              <a:rPr lang="fr-FR" sz="1600" b="1" i="1" dirty="0">
+                <a:solidFill>
+                  <a:schemeClr val="bg1">
+                    <a:lumMod val="95000"/>
+                  </a:schemeClr>
+                </a:solidFill>
+                <a:latin typeface="Century Gothic" panose="020B0502020202020204" pitchFamily="34" charset="0"/>
+              </a:rPr>
+              <a:t>MABOOL</a:t>
+            </a:r>
+          </a:p>
+        </p:txBody>
+      </p:sp>
+      <p:sp>
+        <p:nvSpPr>
+          <p:cNvPr id="26" name="ZoneTexte 25">
+            <a:extLst>
+              <a:ext uri="{FF2B5EF4-FFF2-40B4-BE49-F238E27FC236}">
+                <a16:creationId xmlns:a16="http://schemas.microsoft.com/office/drawing/2014/main" id="{241B8BC9-A5C8-514B-DFAE-697532DFF0B8}"/>
+              </a:ext>
+            </a:extLst>
+          </p:cNvPr>
+          <p:cNvSpPr txBox="1"/>
+          <p:nvPr/>
+        </p:nvSpPr>
+        <p:spPr>
+          <a:xfrm>
+            <a:off x="3099609" y="4509078"/>
+            <a:ext cx="2267475" cy="253916"/>
+          </a:xfrm>
+          <a:prstGeom prst="rect">
+            <a:avLst/>
+          </a:prstGeom>
+          <a:noFill/>
+        </p:spPr>
+        <p:txBody>
+          <a:bodyPr wrap="square" rtlCol="0">
+            <a:spAutoFit/>
+          </a:bodyPr>
+          <a:lstStyle/>
+          <a:p>
+            <a:r>
+              <a:rPr lang="fr-FR" sz="1050" dirty="0">
+                <a:solidFill>
+                  <a:schemeClr val="bg1">
+                    <a:lumMod val="85000"/>
+                  </a:schemeClr>
+                </a:solidFill>
+                <a:latin typeface="Century Gothic" panose="020B0502020202020204" pitchFamily="34" charset="0"/>
+              </a:rPr>
+              <a:t>© Baptiste BIDEAUX 2022</a:t>
+            </a:r>
+          </a:p>
+        </p:txBody>
+      </p:sp>
+      <p:pic>
+        <p:nvPicPr>
+          <p:cNvPr id="3" name="Image 2">
+            <a:extLst>
+              <a:ext uri="{FF2B5EF4-FFF2-40B4-BE49-F238E27FC236}">
+                <a16:creationId xmlns:a16="http://schemas.microsoft.com/office/drawing/2014/main" id="{D6641FCC-9208-607F-1E1C-DFFE27964673}"/>
+              </a:ext>
+            </a:extLst>
+          </p:cNvPr>
+          <p:cNvPicPr>
+            <a:picLocks noChangeAspect="1"/>
+          </p:cNvPicPr>
+          <p:nvPr/>
+        </p:nvPicPr>
+        <p:blipFill>
+          <a:blip r:embed="rId3">
+            <a:lum bright="70000" contrast="-70000"/>
+            <a:extLst>
+              <a:ext uri="{BEBA8EAE-BF5A-486C-A8C5-ECC9F3942E4B}">
+                <a14:imgProps xmlns:a14="http://schemas.microsoft.com/office/drawing/2010/main">
+                  <a14:imgLayer r:embed="rId4">
+                    <a14:imgEffect>
+                      <a14:colorTemperature colorTemp="11200"/>
+                    </a14:imgEffect>
+                  </a14:imgLayer>
+                </a14:imgProps>
+              </a:ext>
+            </a:extLst>
+          </a:blip>
+          <a:stretch>
+            <a:fillRect/>
+          </a:stretch>
+        </p:blipFill>
+        <p:spPr>
+          <a:xfrm>
+            <a:off x="6824917" y="2016122"/>
+            <a:ext cx="2050472" cy="514896"/>
+          </a:xfrm>
+          <a:prstGeom prst="rect">
+            <a:avLst/>
+          </a:prstGeom>
+        </p:spPr>
+      </p:pic>
+    </p:spTree>
+    <p:extLst>
+      <p:ext uri="{BB962C8B-B14F-4D97-AF65-F5344CB8AC3E}">
+        <p14:creationId xmlns:p14="http://schemas.microsoft.com/office/powerpoint/2010/main" val="822832698"/>
+      </p:ext>
+    </p:extLst>
+  </p:cSld>
+  <p:clrMapOvr>
+    <a:masterClrMapping/>
+  </p:clrMapOvr>
+</p:sld>
+</file>
+
+<file path=ppt/slides/slide20.xml><?xml version="1.0" encoding="utf-8"?>
 <p:sld xmlns:a="http://schemas.openxmlformats.org/drawingml/2006/main" xmlns:r="http://schemas.openxmlformats.org/officeDocument/2006/relationships" xmlns:p="http://schemas.openxmlformats.org/presentationml/2006/main">
   <p:cSld>
     <p:spTree>
@@ -22830,476 +24180,7 @@
 </p:sld>
 </file>
 
-<file path=ppt/slides/slide2.xml><?xml version="1.0" encoding="utf-8"?>
-<p:sld xmlns:a="http://schemas.openxmlformats.org/drawingml/2006/main" xmlns:r="http://schemas.openxmlformats.org/officeDocument/2006/relationships" xmlns:p="http://schemas.openxmlformats.org/presentationml/2006/main">
-  <p:cSld>
-    <p:spTree>
-      <p:nvGrpSpPr>
-        <p:cNvPr id="1" name=""/>
-        <p:cNvGrpSpPr/>
-        <p:nvPr/>
-      </p:nvGrpSpPr>
-      <p:grpSpPr>
-        <a:xfrm>
-          <a:off x="0" y="0"/>
-          <a:ext cx="0" cy="0"/>
-          <a:chOff x="0" y="0"/>
-          <a:chExt cx="0" cy="0"/>
-        </a:xfrm>
-      </p:grpSpPr>
-      <p:pic>
-        <p:nvPicPr>
-          <p:cNvPr id="1026" name="Picture 2">
-            <a:extLst>
-              <a:ext uri="{FF2B5EF4-FFF2-40B4-BE49-F238E27FC236}">
-                <a16:creationId xmlns:a16="http://schemas.microsoft.com/office/drawing/2014/main" id="{8096EDF5-A031-52C5-FB8E-D81632735F26}"/>
-              </a:ext>
-            </a:extLst>
-          </p:cNvPr>
-          <p:cNvPicPr>
-            <a:picLocks noChangeAspect="1" noChangeArrowheads="1"/>
-          </p:cNvPicPr>
-          <p:nvPr/>
-        </p:nvPicPr>
-        <p:blipFill rotWithShape="1">
-          <a:blip r:embed="rId2">
-            <a:extLst>
-              <a:ext uri="{28A0092B-C50C-407E-A947-70E740481C1C}">
-                <a14:useLocalDpi xmlns:a14="http://schemas.microsoft.com/office/drawing/2010/main" val="0"/>
-              </a:ext>
-            </a:extLst>
-          </a:blip>
-          <a:srcRect l="9566" t="23675" r="9132" b="24419"/>
-          <a:stretch/>
-        </p:blipFill>
-        <p:spPr bwMode="auto">
-          <a:xfrm>
-            <a:off x="2391439" y="1425942"/>
-            <a:ext cx="7409121" cy="4730309"/>
-          </a:xfrm>
-          <a:prstGeom prst="rect">
-            <a:avLst/>
-          </a:prstGeom>
-          <a:noFill/>
-          <a:extLst>
-            <a:ext uri="{909E8E84-426E-40DD-AFC4-6F175D3DCCD1}">
-              <a14:hiddenFill xmlns:a14="http://schemas.microsoft.com/office/drawing/2010/main">
-                <a:solidFill>
-                  <a:srgbClr val="FFFFFF"/>
-                </a:solidFill>
-              </a14:hiddenFill>
-            </a:ext>
-          </a:extLst>
-        </p:spPr>
-      </p:pic>
-      <p:sp>
-        <p:nvSpPr>
-          <p:cNvPr id="16" name="Forme libre : forme 15">
-            <a:extLst>
-              <a:ext uri="{FF2B5EF4-FFF2-40B4-BE49-F238E27FC236}">
-                <a16:creationId xmlns:a16="http://schemas.microsoft.com/office/drawing/2014/main" id="{D467B6A8-93B1-BAF7-8F0F-F4D8390F996B}"/>
-              </a:ext>
-            </a:extLst>
-          </p:cNvPr>
-          <p:cNvSpPr/>
-          <p:nvPr/>
-        </p:nvSpPr>
-        <p:spPr>
-          <a:xfrm>
-            <a:off x="2803449" y="1835291"/>
-            <a:ext cx="6521303" cy="2966489"/>
-          </a:xfrm>
-          <a:custGeom>
-            <a:avLst/>
-            <a:gdLst>
-              <a:gd name="connsiteX0" fmla="*/ 1680242 w 6521303"/>
-              <a:gd name="connsiteY0" fmla="*/ 1073895 h 2966489"/>
-              <a:gd name="connsiteX1" fmla="*/ 1077435 w 6521303"/>
-              <a:gd name="connsiteY1" fmla="*/ 1676702 h 2966489"/>
-              <a:gd name="connsiteX2" fmla="*/ 1680242 w 6521303"/>
-              <a:gd name="connsiteY2" fmla="*/ 2279509 h 2966489"/>
-              <a:gd name="connsiteX3" fmla="*/ 4887139 w 6521303"/>
-              <a:gd name="connsiteY3" fmla="*/ 2279509 h 2966489"/>
-              <a:gd name="connsiteX4" fmla="*/ 5489946 w 6521303"/>
-              <a:gd name="connsiteY4" fmla="*/ 1676702 h 2966489"/>
-              <a:gd name="connsiteX5" fmla="*/ 4887139 w 6521303"/>
-              <a:gd name="connsiteY5" fmla="*/ 1073895 h 2966489"/>
-              <a:gd name="connsiteX6" fmla="*/ 350878 w 6521303"/>
-              <a:gd name="connsiteY6" fmla="*/ 0 h 2966489"/>
-              <a:gd name="connsiteX7" fmla="*/ 6170426 w 6521303"/>
-              <a:gd name="connsiteY7" fmla="*/ 0 h 2966489"/>
-              <a:gd name="connsiteX8" fmla="*/ 6521303 w 6521303"/>
-              <a:gd name="connsiteY8" fmla="*/ 350877 h 2966489"/>
-              <a:gd name="connsiteX9" fmla="*/ 6521303 w 6521303"/>
-              <a:gd name="connsiteY9" fmla="*/ 701754 h 2966489"/>
-              <a:gd name="connsiteX10" fmla="*/ 6521302 w 6521303"/>
-              <a:gd name="connsiteY10" fmla="*/ 701754 h 2966489"/>
-              <a:gd name="connsiteX11" fmla="*/ 6521302 w 6521303"/>
-              <a:gd name="connsiteY11" fmla="*/ 2732565 h 2966489"/>
-              <a:gd name="connsiteX12" fmla="*/ 6287378 w 6521303"/>
-              <a:gd name="connsiteY12" fmla="*/ 2966489 h 2966489"/>
-              <a:gd name="connsiteX13" fmla="*/ 233924 w 6521303"/>
-              <a:gd name="connsiteY13" fmla="*/ 2966489 h 2966489"/>
-              <a:gd name="connsiteX14" fmla="*/ 0 w 6521303"/>
-              <a:gd name="connsiteY14" fmla="*/ 2732565 h 2966489"/>
-              <a:gd name="connsiteX15" fmla="*/ 0 w 6521303"/>
-              <a:gd name="connsiteY15" fmla="*/ 701754 h 2966489"/>
-              <a:gd name="connsiteX16" fmla="*/ 1 w 6521303"/>
-              <a:gd name="connsiteY16" fmla="*/ 701754 h 2966489"/>
-              <a:gd name="connsiteX17" fmla="*/ 1 w 6521303"/>
-              <a:gd name="connsiteY17" fmla="*/ 350877 h 2966489"/>
-            </a:gdLst>
-            <a:ahLst/>
-            <a:cxnLst>
-              <a:cxn ang="0">
-                <a:pos x="connsiteX0" y="connsiteY0"/>
-              </a:cxn>
-              <a:cxn ang="0">
-                <a:pos x="connsiteX1" y="connsiteY1"/>
-              </a:cxn>
-              <a:cxn ang="0">
-                <a:pos x="connsiteX2" y="connsiteY2"/>
-              </a:cxn>
-              <a:cxn ang="0">
-                <a:pos x="connsiteX3" y="connsiteY3"/>
-              </a:cxn>
-              <a:cxn ang="0">
-                <a:pos x="connsiteX4" y="connsiteY4"/>
-              </a:cxn>
-              <a:cxn ang="0">
-                <a:pos x="connsiteX5" y="connsiteY5"/>
-              </a:cxn>
-              <a:cxn ang="0">
-                <a:pos x="connsiteX6" y="connsiteY6"/>
-              </a:cxn>
-              <a:cxn ang="0">
-                <a:pos x="connsiteX7" y="connsiteY7"/>
-              </a:cxn>
-              <a:cxn ang="0">
-                <a:pos x="connsiteX8" y="connsiteY8"/>
-              </a:cxn>
-              <a:cxn ang="0">
-                <a:pos x="connsiteX9" y="connsiteY9"/>
-              </a:cxn>
-              <a:cxn ang="0">
-                <a:pos x="connsiteX10" y="connsiteY10"/>
-              </a:cxn>
-              <a:cxn ang="0">
-                <a:pos x="connsiteX11" y="connsiteY11"/>
-              </a:cxn>
-              <a:cxn ang="0">
-                <a:pos x="connsiteX12" y="connsiteY12"/>
-              </a:cxn>
-              <a:cxn ang="0">
-                <a:pos x="connsiteX13" y="connsiteY13"/>
-              </a:cxn>
-              <a:cxn ang="0">
-                <a:pos x="connsiteX14" y="connsiteY14"/>
-              </a:cxn>
-              <a:cxn ang="0">
-                <a:pos x="connsiteX15" y="connsiteY15"/>
-              </a:cxn>
-              <a:cxn ang="0">
-                <a:pos x="connsiteX16" y="connsiteY16"/>
-              </a:cxn>
-              <a:cxn ang="0">
-                <a:pos x="connsiteX17" y="connsiteY17"/>
-              </a:cxn>
-            </a:cxnLst>
-            <a:rect l="l" t="t" r="r" b="b"/>
-            <a:pathLst>
-              <a:path w="6521303" h="2966489">
-                <a:moveTo>
-                  <a:pt x="1680242" y="1073895"/>
-                </a:moveTo>
-                <a:cubicBezTo>
-                  <a:pt x="1347321" y="1073895"/>
-                  <a:pt x="1077435" y="1343781"/>
-                  <a:pt x="1077435" y="1676702"/>
-                </a:cubicBezTo>
-                <a:cubicBezTo>
-                  <a:pt x="1077435" y="2009623"/>
-                  <a:pt x="1347321" y="2279509"/>
-                  <a:pt x="1680242" y="2279509"/>
-                </a:cubicBezTo>
-                <a:lnTo>
-                  <a:pt x="4887139" y="2279509"/>
-                </a:lnTo>
-                <a:cubicBezTo>
-                  <a:pt x="5220060" y="2279509"/>
-                  <a:pt x="5489946" y="2009623"/>
-                  <a:pt x="5489946" y="1676702"/>
-                </a:cubicBezTo>
-                <a:cubicBezTo>
-                  <a:pt x="5489946" y="1343781"/>
-                  <a:pt x="5220060" y="1073895"/>
-                  <a:pt x="4887139" y="1073895"/>
-                </a:cubicBezTo>
-                <a:close/>
-                <a:moveTo>
-                  <a:pt x="350878" y="0"/>
-                </a:moveTo>
-                <a:lnTo>
-                  <a:pt x="6170426" y="0"/>
-                </a:lnTo>
-                <a:lnTo>
-                  <a:pt x="6521303" y="350877"/>
-                </a:lnTo>
-                <a:lnTo>
-                  <a:pt x="6521303" y="701754"/>
-                </a:lnTo>
-                <a:lnTo>
-                  <a:pt x="6521302" y="701754"/>
-                </a:lnTo>
-                <a:lnTo>
-                  <a:pt x="6521302" y="2732565"/>
-                </a:lnTo>
-                <a:cubicBezTo>
-                  <a:pt x="6521302" y="2861758"/>
-                  <a:pt x="6416571" y="2966489"/>
-                  <a:pt x="6287378" y="2966489"/>
-                </a:cubicBezTo>
-                <a:lnTo>
-                  <a:pt x="233924" y="2966489"/>
-                </a:lnTo>
-                <a:cubicBezTo>
-                  <a:pt x="104731" y="2966489"/>
-                  <a:pt x="0" y="2861758"/>
-                  <a:pt x="0" y="2732565"/>
-                </a:cubicBezTo>
-                <a:lnTo>
-                  <a:pt x="0" y="701754"/>
-                </a:lnTo>
-                <a:lnTo>
-                  <a:pt x="1" y="701754"/>
-                </a:lnTo>
-                <a:lnTo>
-                  <a:pt x="1" y="350877"/>
-                </a:lnTo>
-                <a:close/>
-              </a:path>
-            </a:pathLst>
-          </a:custGeom>
-          <a:solidFill>
-            <a:schemeClr val="tx1"/>
-          </a:solidFill>
-          <a:ln>
-            <a:noFill/>
-          </a:ln>
-        </p:spPr>
-        <p:style>
-          <a:lnRef idx="2">
-            <a:schemeClr val="accent1">
-              <a:shade val="50000"/>
-            </a:schemeClr>
-          </a:lnRef>
-          <a:fillRef idx="1">
-            <a:schemeClr val="accent1"/>
-          </a:fillRef>
-          <a:effectRef idx="0">
-            <a:schemeClr val="accent1"/>
-          </a:effectRef>
-          <a:fontRef idx="minor">
-            <a:schemeClr val="lt1"/>
-          </a:fontRef>
-        </p:style>
-        <p:txBody>
-          <a:bodyPr wrap="square" rtlCol="0" anchor="ctr">
-            <a:noAutofit/>
-          </a:bodyPr>
-          <a:lstStyle/>
-          <a:p>
-            <a:pPr algn="ctr"/>
-            <a:endParaRPr lang="fr-FR"/>
-          </a:p>
-        </p:txBody>
-      </p:sp>
-      <p:cxnSp>
-        <p:nvCxnSpPr>
-          <p:cNvPr id="13" name="Connecteur droit 12">
-            <a:extLst>
-              <a:ext uri="{FF2B5EF4-FFF2-40B4-BE49-F238E27FC236}">
-                <a16:creationId xmlns:a16="http://schemas.microsoft.com/office/drawing/2014/main" id="{99F4D875-28F5-E3D8-4DC3-5E62F8B77747}"/>
-              </a:ext>
-            </a:extLst>
-          </p:cNvPr>
-          <p:cNvCxnSpPr>
-            <a:cxnSpLocks/>
-          </p:cNvCxnSpPr>
-          <p:nvPr/>
-        </p:nvCxnSpPr>
-        <p:spPr>
-          <a:xfrm>
-            <a:off x="3189767" y="2374685"/>
-            <a:ext cx="3120654" cy="26496"/>
-          </a:xfrm>
-          <a:prstGeom prst="line">
-            <a:avLst/>
-          </a:prstGeom>
-          <a:ln w="12700">
-            <a:solidFill>
-              <a:schemeClr val="bg1">
-                <a:lumMod val="95000"/>
-              </a:schemeClr>
-            </a:solidFill>
-          </a:ln>
-        </p:spPr>
-        <p:style>
-          <a:lnRef idx="1">
-            <a:schemeClr val="accent1"/>
-          </a:lnRef>
-          <a:fillRef idx="0">
-            <a:schemeClr val="accent1"/>
-          </a:fillRef>
-          <a:effectRef idx="0">
-            <a:schemeClr val="accent1"/>
-          </a:effectRef>
-          <a:fontRef idx="minor">
-            <a:schemeClr val="tx1"/>
-          </a:fontRef>
-        </p:style>
-      </p:cxnSp>
-      <p:sp>
-        <p:nvSpPr>
-          <p:cNvPr id="25" name="ZoneTexte 24">
-            <a:extLst>
-              <a:ext uri="{FF2B5EF4-FFF2-40B4-BE49-F238E27FC236}">
-                <a16:creationId xmlns:a16="http://schemas.microsoft.com/office/drawing/2014/main" id="{B333F463-26DE-4258-1722-44B2E8398823}"/>
-              </a:ext>
-            </a:extLst>
-          </p:cNvPr>
-          <p:cNvSpPr txBox="1"/>
-          <p:nvPr/>
-        </p:nvSpPr>
-        <p:spPr>
-          <a:xfrm>
-            <a:off x="3099610" y="2016122"/>
-            <a:ext cx="2267475" cy="338554"/>
-          </a:xfrm>
-          <a:prstGeom prst="rect">
-            <a:avLst/>
-          </a:prstGeom>
-          <a:noFill/>
-        </p:spPr>
-        <p:txBody>
-          <a:bodyPr wrap="square" rtlCol="0">
-            <a:spAutoFit/>
-          </a:bodyPr>
-          <a:lstStyle/>
-          <a:p>
-            <a:r>
-              <a:rPr lang="fr-FR" sz="1600" b="1" i="1" dirty="0">
-                <a:solidFill>
-                  <a:schemeClr val="bg1">
-                    <a:lumMod val="95000"/>
-                  </a:schemeClr>
-                </a:solidFill>
-                <a:latin typeface="Century Gothic" panose="020B0502020202020204" pitchFamily="34" charset="0"/>
-              </a:rPr>
-              <a:t>MABOOL</a:t>
-            </a:r>
-          </a:p>
-        </p:txBody>
-      </p:sp>
-      <p:sp>
-        <p:nvSpPr>
-          <p:cNvPr id="26" name="ZoneTexte 25">
-            <a:extLst>
-              <a:ext uri="{FF2B5EF4-FFF2-40B4-BE49-F238E27FC236}">
-                <a16:creationId xmlns:a16="http://schemas.microsoft.com/office/drawing/2014/main" id="{241B8BC9-A5C8-514B-DFAE-697532DFF0B8}"/>
-              </a:ext>
-            </a:extLst>
-          </p:cNvPr>
-          <p:cNvSpPr txBox="1"/>
-          <p:nvPr/>
-        </p:nvSpPr>
-        <p:spPr>
-          <a:xfrm>
-            <a:off x="3099609" y="4509078"/>
-            <a:ext cx="2267475" cy="253916"/>
-          </a:xfrm>
-          <a:prstGeom prst="rect">
-            <a:avLst/>
-          </a:prstGeom>
-          <a:noFill/>
-        </p:spPr>
-        <p:txBody>
-          <a:bodyPr wrap="square" rtlCol="0">
-            <a:spAutoFit/>
-          </a:bodyPr>
-          <a:lstStyle/>
-          <a:p>
-            <a:r>
-              <a:rPr lang="fr-FR" sz="1050" dirty="0">
-                <a:solidFill>
-                  <a:schemeClr val="bg1">
-                    <a:lumMod val="85000"/>
-                  </a:schemeClr>
-                </a:solidFill>
-                <a:latin typeface="Century Gothic" panose="020B0502020202020204" pitchFamily="34" charset="0"/>
-              </a:rPr>
-              <a:t>© Baptiste BIDEAUX 2022</a:t>
-            </a:r>
-          </a:p>
-        </p:txBody>
-      </p:sp>
-      <p:pic>
-        <p:nvPicPr>
-          <p:cNvPr id="3" name="Image 2">
-            <a:extLst>
-              <a:ext uri="{FF2B5EF4-FFF2-40B4-BE49-F238E27FC236}">
-                <a16:creationId xmlns:a16="http://schemas.microsoft.com/office/drawing/2014/main" id="{D6641FCC-9208-607F-1E1C-DFFE27964673}"/>
-              </a:ext>
-            </a:extLst>
-          </p:cNvPr>
-          <p:cNvPicPr>
-            <a:picLocks noChangeAspect="1"/>
-          </p:cNvPicPr>
-          <p:nvPr/>
-        </p:nvPicPr>
-        <p:blipFill>
-          <a:blip r:embed="rId3">
-            <a:lum bright="70000" contrast="-70000"/>
-            <a:extLst>
-              <a:ext uri="{BEBA8EAE-BF5A-486C-A8C5-ECC9F3942E4B}">
-                <a14:imgProps xmlns:a14="http://schemas.microsoft.com/office/drawing/2010/main">
-                  <a14:imgLayer r:embed="rId4">
-                    <a14:imgEffect>
-                      <a14:colorTemperature colorTemp="11200"/>
-                    </a14:imgEffect>
-                  </a14:imgLayer>
-                </a14:imgProps>
-              </a:ext>
-            </a:extLst>
-          </a:blip>
-          <a:stretch>
-            <a:fillRect/>
-          </a:stretch>
-        </p:blipFill>
-        <p:spPr>
-          <a:xfrm>
-            <a:off x="6824917" y="2016122"/>
-            <a:ext cx="2050472" cy="514896"/>
-          </a:xfrm>
-          <a:prstGeom prst="rect">
-            <a:avLst/>
-          </a:prstGeom>
-        </p:spPr>
-      </p:pic>
-    </p:spTree>
-    <p:extLst>
-      <p:ext uri="{BB962C8B-B14F-4D97-AF65-F5344CB8AC3E}">
-        <p14:creationId xmlns:p14="http://schemas.microsoft.com/office/powerpoint/2010/main" val="822832698"/>
-      </p:ext>
-    </p:extLst>
-  </p:cSld>
-  <p:clrMapOvr>
-    <a:masterClrMapping/>
-  </p:clrMapOvr>
-</p:sld>
-</file>
-
-<file path=ppt/slides/slide20.xml><?xml version="1.0" encoding="utf-8"?>
+<file path=ppt/slides/slide21.xml><?xml version="1.0" encoding="utf-8"?>
 <p:sld xmlns:a="http://schemas.openxmlformats.org/drawingml/2006/main" xmlns:r="http://schemas.openxmlformats.org/officeDocument/2006/relationships" xmlns:p="http://schemas.openxmlformats.org/presentationml/2006/main">
   <p:cSld>
     <p:spTree>
@@ -26485,6 +27366,227 @@
           <a:chExt cx="0" cy="0"/>
         </a:xfrm>
       </p:grpSpPr>
+      <p:pic>
+        <p:nvPicPr>
+          <p:cNvPr id="3" name="Image 2">
+            <a:extLst>
+              <a:ext uri="{FF2B5EF4-FFF2-40B4-BE49-F238E27FC236}">
+                <a16:creationId xmlns:a16="http://schemas.microsoft.com/office/drawing/2014/main" id="{10C4FEA9-1611-3362-6D79-A0AE726D3E1D}"/>
+              </a:ext>
+            </a:extLst>
+          </p:cNvPr>
+          <p:cNvPicPr>
+            <a:picLocks noChangeAspect="1"/>
+          </p:cNvPicPr>
+          <p:nvPr/>
+        </p:nvPicPr>
+        <p:blipFill>
+          <a:blip r:embed="rId2"/>
+          <a:stretch>
+            <a:fillRect/>
+          </a:stretch>
+        </p:blipFill>
+        <p:spPr>
+          <a:xfrm>
+            <a:off x="3243096" y="755759"/>
+            <a:ext cx="6000750" cy="4762500"/>
+          </a:xfrm>
+          <a:prstGeom prst="rect">
+            <a:avLst/>
+          </a:prstGeom>
+        </p:spPr>
+      </p:pic>
+      <p:pic>
+        <p:nvPicPr>
+          <p:cNvPr id="4" name="Picture 8" descr="Rétro Jeu Hippie Néon Paysage Avec Labyrinthe Obscur Clip Art Libres De  Droits , Svg , Vecteurs Et Illustration. Image 48483234.">
+            <a:extLst>
+              <a:ext uri="{FF2B5EF4-FFF2-40B4-BE49-F238E27FC236}">
+                <a16:creationId xmlns:a16="http://schemas.microsoft.com/office/drawing/2014/main" id="{86CB955F-30A5-F2AD-21D1-EC53C27101F5}"/>
+              </a:ext>
+            </a:extLst>
+          </p:cNvPr>
+          <p:cNvPicPr>
+            <a:picLocks noChangeAspect="1" noChangeArrowheads="1"/>
+          </p:cNvPicPr>
+          <p:nvPr/>
+        </p:nvPicPr>
+        <p:blipFill rotWithShape="1">
+          <a:blip r:embed="rId3">
+            <a:extLst>
+              <a:ext uri="{28A0092B-C50C-407E-A947-70E740481C1C}">
+                <a14:useLocalDpi xmlns:a14="http://schemas.microsoft.com/office/drawing/2010/main" val="0"/>
+              </a:ext>
+            </a:extLst>
+          </a:blip>
+          <a:srcRect l="5448" t="23844" r="13394" b="16286"/>
+          <a:stretch/>
+        </p:blipFill>
+        <p:spPr bwMode="auto">
+          <a:xfrm>
+            <a:off x="3243096" y="755759"/>
+            <a:ext cx="6000750" cy="4762500"/>
+          </a:xfrm>
+          <a:prstGeom prst="rect">
+            <a:avLst/>
+          </a:prstGeom>
+          <a:noFill/>
+          <a:extLst>
+            <a:ext uri="{909E8E84-426E-40DD-AFC4-6F175D3DCCD1}">
+              <a14:hiddenFill xmlns:a14="http://schemas.microsoft.com/office/drawing/2010/main">
+                <a:solidFill>
+                  <a:srgbClr val="FFFFFF"/>
+                </a:solidFill>
+              </a14:hiddenFill>
+            </a:ext>
+          </a:extLst>
+        </p:spPr>
+      </p:pic>
+      <p:pic>
+        <p:nvPicPr>
+          <p:cNvPr id="6" name="Image 5">
+            <a:extLst>
+              <a:ext uri="{FF2B5EF4-FFF2-40B4-BE49-F238E27FC236}">
+                <a16:creationId xmlns:a16="http://schemas.microsoft.com/office/drawing/2014/main" id="{67E926E1-E27F-F78E-9A9F-68038E77035A}"/>
+              </a:ext>
+            </a:extLst>
+          </p:cNvPr>
+          <p:cNvPicPr>
+            <a:picLocks noChangeAspect="1"/>
+          </p:cNvPicPr>
+          <p:nvPr/>
+        </p:nvPicPr>
+        <p:blipFill rotWithShape="1">
+          <a:blip r:embed="rId4"/>
+          <a:srcRect t="71078"/>
+          <a:stretch/>
+        </p:blipFill>
+        <p:spPr>
+          <a:xfrm>
+            <a:off x="4077724" y="1097978"/>
+            <a:ext cx="4454056" cy="636646"/>
+          </a:xfrm>
+          <a:prstGeom prst="rect">
+            <a:avLst/>
+          </a:prstGeom>
+          <a:effectLst>
+            <a:glow rad="76200">
+              <a:schemeClr val="accent1">
+                <a:lumMod val="20000"/>
+                <a:lumOff val="80000"/>
+              </a:schemeClr>
+            </a:glow>
+          </a:effectLst>
+        </p:spPr>
+      </p:pic>
+      <p:pic>
+        <p:nvPicPr>
+          <p:cNvPr id="7" name="Image 6">
+            <a:extLst>
+              <a:ext uri="{FF2B5EF4-FFF2-40B4-BE49-F238E27FC236}">
+                <a16:creationId xmlns:a16="http://schemas.microsoft.com/office/drawing/2014/main" id="{18774C04-CA07-9BC2-6922-42997D7F16DC}"/>
+              </a:ext>
+            </a:extLst>
+          </p:cNvPr>
+          <p:cNvPicPr>
+            <a:picLocks noChangeAspect="1"/>
+          </p:cNvPicPr>
+          <p:nvPr/>
+        </p:nvPicPr>
+        <p:blipFill rotWithShape="1">
+          <a:blip r:embed="rId4"/>
+          <a:srcRect l="14769" r="17977" b="29280"/>
+          <a:stretch/>
+        </p:blipFill>
+        <p:spPr>
+          <a:xfrm>
+            <a:off x="4014176" y="2144691"/>
+            <a:ext cx="4581152" cy="2380756"/>
+          </a:xfrm>
+          <a:prstGeom prst="rect">
+            <a:avLst/>
+          </a:prstGeom>
+          <a:effectLst>
+            <a:glow rad="76200">
+              <a:schemeClr val="accent1">
+                <a:lumMod val="20000"/>
+                <a:lumOff val="80000"/>
+              </a:schemeClr>
+            </a:glow>
+          </a:effectLst>
+        </p:spPr>
+      </p:pic>
+      <p:pic>
+        <p:nvPicPr>
+          <p:cNvPr id="11" name="Image 10">
+            <a:extLst>
+              <a:ext uri="{FF2B5EF4-FFF2-40B4-BE49-F238E27FC236}">
+                <a16:creationId xmlns:a16="http://schemas.microsoft.com/office/drawing/2014/main" id="{6EED9F1E-E1E7-A136-2FD4-2C8B10DF0EF7}"/>
+              </a:ext>
+            </a:extLst>
+          </p:cNvPr>
+          <p:cNvPicPr>
+            <a:picLocks noChangeAspect="1"/>
+          </p:cNvPicPr>
+          <p:nvPr/>
+        </p:nvPicPr>
+        <p:blipFill>
+          <a:blip r:embed="rId5">
+            <a:extLst>
+              <a:ext uri="{BEBA8EAE-BF5A-486C-A8C5-ECC9F3942E4B}">
+                <a14:imgProps xmlns:a14="http://schemas.microsoft.com/office/drawing/2010/main">
+                  <a14:imgLayer r:embed="rId6">
+                    <a14:imgEffect>
+                      <a14:colorTemperature colorTemp="11200"/>
+                    </a14:imgEffect>
+                  </a14:imgLayer>
+                </a14:imgProps>
+              </a:ext>
+            </a:extLst>
+          </a:blip>
+          <a:stretch>
+            <a:fillRect/>
+          </a:stretch>
+        </p:blipFill>
+        <p:spPr>
+          <a:xfrm>
+            <a:off x="3421633" y="4900412"/>
+            <a:ext cx="2050472" cy="514896"/>
+          </a:xfrm>
+          <a:prstGeom prst="rect">
+            <a:avLst/>
+          </a:prstGeom>
+        </p:spPr>
+      </p:pic>
+    </p:spTree>
+    <p:extLst>
+      <p:ext uri="{BB962C8B-B14F-4D97-AF65-F5344CB8AC3E}">
+        <p14:creationId xmlns:p14="http://schemas.microsoft.com/office/powerpoint/2010/main" val="2823879496"/>
+      </p:ext>
+    </p:extLst>
+  </p:cSld>
+  <p:clrMapOvr>
+    <a:masterClrMapping/>
+  </p:clrMapOvr>
+</p:sld>
+</file>
+
+<file path=ppt/slides/slide5.xml><?xml version="1.0" encoding="utf-8"?>
+<p:sld xmlns:a="http://schemas.openxmlformats.org/drawingml/2006/main" xmlns:r="http://schemas.openxmlformats.org/officeDocument/2006/relationships" xmlns:p="http://schemas.openxmlformats.org/presentationml/2006/main">
+  <p:cSld>
+    <p:spTree>
+      <p:nvGrpSpPr>
+        <p:cNvPr id="1" name=""/>
+        <p:cNvGrpSpPr/>
+        <p:nvPr/>
+      </p:nvGrpSpPr>
+      <p:grpSpPr>
+        <a:xfrm>
+          <a:off x="0" y="0"/>
+          <a:ext cx="0" cy="0"/>
+          <a:chOff x="0" y="0"/>
+          <a:chExt cx="0" cy="0"/>
+        </a:xfrm>
+      </p:grpSpPr>
       <p:sp>
         <p:nvSpPr>
           <p:cNvPr id="5" name="Rectangle 4">
@@ -26843,10 +27945,40 @@
           </a:extLst>
         </p:spPr>
       </p:pic>
+      <p:pic>
+        <p:nvPicPr>
+          <p:cNvPr id="3" name="Image 2">
+            <a:extLst>
+              <a:ext uri="{FF2B5EF4-FFF2-40B4-BE49-F238E27FC236}">
+                <a16:creationId xmlns:a16="http://schemas.microsoft.com/office/drawing/2014/main" id="{9D36966A-8ACD-AD10-F2F3-31667A719A24}"/>
+              </a:ext>
+            </a:extLst>
+          </p:cNvPr>
+          <p:cNvPicPr>
+            <a:picLocks noChangeAspect="1"/>
+          </p:cNvPicPr>
+          <p:nvPr/>
+        </p:nvPicPr>
+        <p:blipFill>
+          <a:blip r:embed="rId7"/>
+          <a:stretch>
+            <a:fillRect/>
+          </a:stretch>
+        </p:blipFill>
+        <p:spPr>
+          <a:xfrm rot="5400000">
+            <a:off x="5647073" y="-208890"/>
+            <a:ext cx="197794" cy="1004796"/>
+          </a:xfrm>
+          <a:prstGeom prst="rect">
+            <a:avLst/>
+          </a:prstGeom>
+        </p:spPr>
+      </p:pic>
     </p:spTree>
     <p:extLst>
       <p:ext uri="{BB962C8B-B14F-4D97-AF65-F5344CB8AC3E}">
-        <p14:creationId xmlns:p14="http://schemas.microsoft.com/office/powerpoint/2010/main" val="2823879496"/>
+        <p14:creationId xmlns:p14="http://schemas.microsoft.com/office/powerpoint/2010/main" val="1003877755"/>
       </p:ext>
     </p:extLst>
   </p:cSld>
@@ -26856,7 +27988,7 @@
 </p:sld>
 </file>
 
-<file path=ppt/slides/slide5.xml><?xml version="1.0" encoding="utf-8"?>
+<file path=ppt/slides/slide6.xml><?xml version="1.0" encoding="utf-8"?>
 <p:sld xmlns:a="http://schemas.openxmlformats.org/drawingml/2006/main" xmlns:r="http://schemas.openxmlformats.org/officeDocument/2006/relationships" xmlns:p="http://schemas.openxmlformats.org/presentationml/2006/main">
   <p:cSld>
     <p:spTree>
@@ -27125,7 +28257,7 @@
 </p:sld>
 </file>
 
-<file path=ppt/slides/slide6.xml><?xml version="1.0" encoding="utf-8"?>
+<file path=ppt/slides/slide7.xml><?xml version="1.0" encoding="utf-8"?>
 <p:sld xmlns:a="http://schemas.openxmlformats.org/drawingml/2006/main" xmlns:r="http://schemas.openxmlformats.org/officeDocument/2006/relationships" xmlns:p="http://schemas.openxmlformats.org/presentationml/2006/main">
   <p:cSld>
     <p:spTree>
@@ -27441,7 +28573,7 @@
 </p:sld>
 </file>
 
-<file path=ppt/slides/slide7.xml><?xml version="1.0" encoding="utf-8"?>
+<file path=ppt/slides/slide8.xml><?xml version="1.0" encoding="utf-8"?>
 <p:sld xmlns:a="http://schemas.openxmlformats.org/drawingml/2006/main" xmlns:r="http://schemas.openxmlformats.org/officeDocument/2006/relationships" xmlns:p="http://schemas.openxmlformats.org/presentationml/2006/main">
   <p:cSld>
     <p:spTree>
@@ -27810,7 +28942,7 @@
 </p:sld>
 </file>
 
-<file path=ppt/slides/slide8.xml><?xml version="1.0" encoding="utf-8"?>
+<file path=ppt/slides/slide9.xml><?xml version="1.0" encoding="utf-8"?>
 <p:sld xmlns:a="http://schemas.openxmlformats.org/drawingml/2006/main" xmlns:r="http://schemas.openxmlformats.org/officeDocument/2006/relationships" xmlns:p="http://schemas.openxmlformats.org/presentationml/2006/main">
   <p:cSld>
     <p:spTree>
@@ -28237,880 +29369,6 @@
 </p:sld>
 </file>
 
-<file path=ppt/slides/slide9.xml><?xml version="1.0" encoding="utf-8"?>
-<p:sld xmlns:a="http://schemas.openxmlformats.org/drawingml/2006/main" xmlns:r="http://schemas.openxmlformats.org/officeDocument/2006/relationships" xmlns:p="http://schemas.openxmlformats.org/presentationml/2006/main">
-  <p:cSld>
-    <p:spTree>
-      <p:nvGrpSpPr>
-        <p:cNvPr id="1" name=""/>
-        <p:cNvGrpSpPr/>
-        <p:nvPr/>
-      </p:nvGrpSpPr>
-      <p:grpSpPr>
-        <a:xfrm>
-          <a:off x="0" y="0"/>
-          <a:ext cx="0" cy="0"/>
-          <a:chOff x="0" y="0"/>
-          <a:chExt cx="0" cy="0"/>
-        </a:xfrm>
-      </p:grpSpPr>
-      <p:grpSp>
-        <p:nvGrpSpPr>
-          <p:cNvPr id="4" name="Groupe 3">
-            <a:extLst>
-              <a:ext uri="{FF2B5EF4-FFF2-40B4-BE49-F238E27FC236}">
-                <a16:creationId xmlns:a16="http://schemas.microsoft.com/office/drawing/2014/main" id="{245F472C-B6B9-EBE9-A183-510A380574F9}"/>
-              </a:ext>
-            </a:extLst>
-          </p:cNvPr>
-          <p:cNvGrpSpPr/>
-          <p:nvPr/>
-        </p:nvGrpSpPr>
-        <p:grpSpPr>
-          <a:xfrm>
-            <a:off x="1345018" y="0"/>
-            <a:ext cx="5108609" cy="6853139"/>
-            <a:chOff x="1573618" y="156802"/>
-            <a:chExt cx="5108609" cy="6853139"/>
-          </a:xfrm>
-          <a:solidFill>
-            <a:schemeClr val="bg1"/>
-          </a:solidFill>
-        </p:grpSpPr>
-        <p:sp>
-          <p:nvSpPr>
-            <p:cNvPr id="5" name="Rectangle 4">
-              <a:extLst>
-                <a:ext uri="{FF2B5EF4-FFF2-40B4-BE49-F238E27FC236}">
-                  <a16:creationId xmlns:a16="http://schemas.microsoft.com/office/drawing/2014/main" id="{EA6271CB-7CB1-8AF6-1FA1-E3EF4709453A}"/>
-                </a:ext>
-              </a:extLst>
-            </p:cNvPr>
-            <p:cNvSpPr/>
-            <p:nvPr/>
-          </p:nvSpPr>
-          <p:spPr>
-            <a:xfrm>
-              <a:off x="1573618" y="156802"/>
-              <a:ext cx="5108609" cy="6853139"/>
-            </a:xfrm>
-            <a:prstGeom prst="rect">
-              <a:avLst/>
-            </a:prstGeom>
-            <a:grpFill/>
-            <a:ln>
-              <a:solidFill>
-                <a:schemeClr val="bg1">
-                  <a:lumMod val="85000"/>
-                </a:schemeClr>
-              </a:solidFill>
-            </a:ln>
-          </p:spPr>
-          <p:style>
-            <a:lnRef idx="2">
-              <a:schemeClr val="accent1">
-                <a:shade val="50000"/>
-              </a:schemeClr>
-            </a:lnRef>
-            <a:fillRef idx="1">
-              <a:schemeClr val="accent1"/>
-            </a:fillRef>
-            <a:effectRef idx="0">
-              <a:schemeClr val="accent1"/>
-            </a:effectRef>
-            <a:fontRef idx="minor">
-              <a:schemeClr val="lt1"/>
-            </a:fontRef>
-          </p:style>
-          <p:txBody>
-            <a:bodyPr rtlCol="0" anchor="ctr"/>
-            <a:lstStyle/>
-            <a:p>
-              <a:pPr algn="ctr"/>
-              <a:endParaRPr lang="fr-FR"/>
-            </a:p>
-          </p:txBody>
-        </p:sp>
-        <p:sp>
-          <p:nvSpPr>
-            <p:cNvPr id="9" name="ZoneTexte 8">
-              <a:extLst>
-                <a:ext uri="{FF2B5EF4-FFF2-40B4-BE49-F238E27FC236}">
-                  <a16:creationId xmlns:a16="http://schemas.microsoft.com/office/drawing/2014/main" id="{7BF7CDFD-AAD3-9FA2-5875-D712D95DEF02}"/>
-                </a:ext>
-              </a:extLst>
-            </p:cNvPr>
-            <p:cNvSpPr txBox="1"/>
-            <p:nvPr/>
-          </p:nvSpPr>
-          <p:spPr>
-            <a:xfrm>
-              <a:off x="1641769" y="846207"/>
-              <a:ext cx="5040458" cy="584775"/>
-            </a:xfrm>
-            <a:prstGeom prst="rect">
-              <a:avLst/>
-            </a:prstGeom>
-            <a:noFill/>
-          </p:spPr>
-          <p:txBody>
-            <a:bodyPr wrap="square" rtlCol="0">
-              <a:spAutoFit/>
-            </a:bodyPr>
-            <a:lstStyle/>
-            <a:p>
-              <a:r>
-                <a:rPr lang="fr-FR" sz="1600" b="1" dirty="0">
-                  <a:latin typeface="Century Gothic" panose="020B0502020202020204" pitchFamily="34" charset="0"/>
-                </a:rPr>
-                <a:t>OBJECTS AND TRAPS
-</a:t>
-              </a:r>
-            </a:p>
-          </p:txBody>
-        </p:sp>
-      </p:grpSp>
-      <p:cxnSp>
-        <p:nvCxnSpPr>
-          <p:cNvPr id="15" name="Connecteur droit 14">
-            <a:extLst>
-              <a:ext uri="{FF2B5EF4-FFF2-40B4-BE49-F238E27FC236}">
-                <a16:creationId xmlns:a16="http://schemas.microsoft.com/office/drawing/2014/main" id="{2C3CD1F2-CFD8-B187-5787-0AFC0DF5C0B9}"/>
-              </a:ext>
-            </a:extLst>
-          </p:cNvPr>
-          <p:cNvCxnSpPr/>
-          <p:nvPr/>
-        </p:nvCxnSpPr>
-        <p:spPr>
-          <a:xfrm>
-            <a:off x="1345018" y="6150279"/>
-            <a:ext cx="5108609" cy="0"/>
-          </a:xfrm>
-          <a:prstGeom prst="line">
-            <a:avLst/>
-          </a:prstGeom>
-          <a:ln w="38100">
-            <a:solidFill>
-              <a:schemeClr val="tx1"/>
-            </a:solidFill>
-          </a:ln>
-        </p:spPr>
-        <p:style>
-          <a:lnRef idx="1">
-            <a:schemeClr val="accent1"/>
-          </a:lnRef>
-          <a:fillRef idx="0">
-            <a:schemeClr val="accent1"/>
-          </a:fillRef>
-          <a:effectRef idx="0">
-            <a:schemeClr val="accent1"/>
-          </a:effectRef>
-          <a:fontRef idx="minor">
-            <a:schemeClr val="tx1"/>
-          </a:fontRef>
-        </p:style>
-      </p:cxnSp>
-      <p:sp>
-        <p:nvSpPr>
-          <p:cNvPr id="10" name="ZoneTexte 9">
-            <a:extLst>
-              <a:ext uri="{FF2B5EF4-FFF2-40B4-BE49-F238E27FC236}">
-                <a16:creationId xmlns:a16="http://schemas.microsoft.com/office/drawing/2014/main" id="{FE24B69D-C1A6-58C6-D56D-D2BD1D5CD9DC}"/>
-              </a:ext>
-            </a:extLst>
-          </p:cNvPr>
-          <p:cNvSpPr txBox="1"/>
-          <p:nvPr/>
-        </p:nvSpPr>
-        <p:spPr>
-          <a:xfrm>
-            <a:off x="1345018" y="140102"/>
-            <a:ext cx="5108608" cy="369332"/>
-          </a:xfrm>
-          <a:prstGeom prst="rect">
-            <a:avLst/>
-          </a:prstGeom>
-          <a:solidFill>
-            <a:schemeClr val="tx1"/>
-          </a:solidFill>
-        </p:spPr>
-        <p:txBody>
-          <a:bodyPr wrap="square" rtlCol="0">
-            <a:spAutoFit/>
-          </a:bodyPr>
-          <a:lstStyle/>
-          <a:p>
-            <a:pPr algn="r"/>
-            <a:r>
-              <a:rPr lang="fr-FR" b="1" dirty="0">
-                <a:solidFill>
-                  <a:schemeClr val="bg1"/>
-                </a:solidFill>
-                <a:latin typeface="Century Gothic" panose="020B0502020202020204" pitchFamily="34" charset="0"/>
-              </a:rPr>
-              <a:t>English</a:t>
-            </a:r>
-          </a:p>
-        </p:txBody>
-      </p:sp>
-      <p:sp>
-        <p:nvSpPr>
-          <p:cNvPr id="13" name="ZoneTexte 12">
-            <a:extLst>
-              <a:ext uri="{FF2B5EF4-FFF2-40B4-BE49-F238E27FC236}">
-                <a16:creationId xmlns:a16="http://schemas.microsoft.com/office/drawing/2014/main" id="{594700FB-AEB1-AE31-EF82-2E62536C8379}"/>
-              </a:ext>
-            </a:extLst>
-          </p:cNvPr>
-          <p:cNvSpPr txBox="1"/>
-          <p:nvPr/>
-        </p:nvSpPr>
-        <p:spPr>
-          <a:xfrm>
-            <a:off x="2676179" y="1321376"/>
-            <a:ext cx="3777448" cy="338553"/>
-          </a:xfrm>
-          <a:prstGeom prst="rect">
-            <a:avLst/>
-          </a:prstGeom>
-          <a:noFill/>
-        </p:spPr>
-        <p:txBody>
-          <a:bodyPr wrap="square" rtlCol="0">
-            <a:spAutoFit/>
-          </a:bodyPr>
-          <a:lstStyle/>
-          <a:p>
-            <a:r>
-              <a:rPr lang="fr-FR" sz="1600" i="1" dirty="0">
-                <a:latin typeface="Century Gothic" panose="020B0502020202020204" pitchFamily="34" charset="0"/>
-              </a:rPr>
-              <a:t>Our </a:t>
-            </a:r>
-            <a:r>
-              <a:rPr lang="fr-FR" sz="1600" i="1" dirty="0" err="1">
-                <a:latin typeface="Century Gothic" panose="020B0502020202020204" pitchFamily="34" charset="0"/>
-              </a:rPr>
-              <a:t>hero</a:t>
-            </a:r>
-            <a:r>
-              <a:rPr lang="fr-FR" sz="1600" i="1" dirty="0">
-                <a:latin typeface="Century Gothic" panose="020B0502020202020204" pitchFamily="34" charset="0"/>
-              </a:rPr>
-              <a:t>, </a:t>
-            </a:r>
-            <a:r>
-              <a:rPr lang="fr-FR" sz="1600" i="1" dirty="0" err="1">
-                <a:latin typeface="Century Gothic" panose="020B0502020202020204" pitchFamily="34" charset="0"/>
-              </a:rPr>
-              <a:t>Mabool</a:t>
-            </a:r>
-            <a:r>
-              <a:rPr lang="fr-FR" sz="1600" i="1" dirty="0">
-                <a:latin typeface="Century Gothic" panose="020B0502020202020204" pitchFamily="34" charset="0"/>
-              </a:rPr>
-              <a:t>.</a:t>
-            </a:r>
-          </a:p>
-        </p:txBody>
-      </p:sp>
-      <p:pic>
-        <p:nvPicPr>
-          <p:cNvPr id="7" name="Image 6">
-            <a:extLst>
-              <a:ext uri="{FF2B5EF4-FFF2-40B4-BE49-F238E27FC236}">
-                <a16:creationId xmlns:a16="http://schemas.microsoft.com/office/drawing/2014/main" id="{833371FA-8E6F-4995-0CA7-762D23E8502D}"/>
-              </a:ext>
-            </a:extLst>
-          </p:cNvPr>
-          <p:cNvPicPr>
-            <a:picLocks noChangeAspect="1"/>
-          </p:cNvPicPr>
-          <p:nvPr/>
-        </p:nvPicPr>
-        <p:blipFill>
-          <a:blip r:embed="rId2"/>
-          <a:stretch>
-            <a:fillRect/>
-          </a:stretch>
-        </p:blipFill>
-        <p:spPr>
-          <a:xfrm>
-            <a:off x="2077756" y="1211890"/>
-            <a:ext cx="446022" cy="557527"/>
-          </a:xfrm>
-          <a:prstGeom prst="rect">
-            <a:avLst/>
-          </a:prstGeom>
-        </p:spPr>
-      </p:pic>
-      <p:pic>
-        <p:nvPicPr>
-          <p:cNvPr id="14" name="Image 13">
-            <a:extLst>
-              <a:ext uri="{FF2B5EF4-FFF2-40B4-BE49-F238E27FC236}">
-                <a16:creationId xmlns:a16="http://schemas.microsoft.com/office/drawing/2014/main" id="{EBF38A5B-3E5B-DD04-FB25-B43A1ADF3364}"/>
-              </a:ext>
-            </a:extLst>
-          </p:cNvPr>
-          <p:cNvPicPr>
-            <a:picLocks noChangeAspect="1"/>
-          </p:cNvPicPr>
-          <p:nvPr/>
-        </p:nvPicPr>
-        <p:blipFill>
-          <a:blip r:embed="rId3"/>
-          <a:stretch>
-            <a:fillRect/>
-          </a:stretch>
-        </p:blipFill>
-        <p:spPr>
-          <a:xfrm>
-            <a:off x="1631734" y="1899693"/>
-            <a:ext cx="446023" cy="557529"/>
-          </a:xfrm>
-          <a:prstGeom prst="rect">
-            <a:avLst/>
-          </a:prstGeom>
-        </p:spPr>
-      </p:pic>
-      <p:pic>
-        <p:nvPicPr>
-          <p:cNvPr id="17" name="Image 16">
-            <a:extLst>
-              <a:ext uri="{FF2B5EF4-FFF2-40B4-BE49-F238E27FC236}">
-                <a16:creationId xmlns:a16="http://schemas.microsoft.com/office/drawing/2014/main" id="{8226D2FA-6059-D647-E7E9-B40CB6B45F0E}"/>
-              </a:ext>
-            </a:extLst>
-          </p:cNvPr>
-          <p:cNvPicPr>
-            <a:picLocks noChangeAspect="1"/>
-          </p:cNvPicPr>
-          <p:nvPr/>
-        </p:nvPicPr>
-        <p:blipFill>
-          <a:blip r:embed="rId4"/>
-          <a:stretch>
-            <a:fillRect/>
-          </a:stretch>
-        </p:blipFill>
-        <p:spPr>
-          <a:xfrm>
-            <a:off x="2077756" y="1899693"/>
-            <a:ext cx="446021" cy="557526"/>
-          </a:xfrm>
-          <a:prstGeom prst="rect">
-            <a:avLst/>
-          </a:prstGeom>
-        </p:spPr>
-      </p:pic>
-      <p:sp>
-        <p:nvSpPr>
-          <p:cNvPr id="18" name="ZoneTexte 17">
-            <a:extLst>
-              <a:ext uri="{FF2B5EF4-FFF2-40B4-BE49-F238E27FC236}">
-                <a16:creationId xmlns:a16="http://schemas.microsoft.com/office/drawing/2014/main" id="{81ABB822-6853-48F3-97FA-A50115BBB710}"/>
-              </a:ext>
-            </a:extLst>
-          </p:cNvPr>
-          <p:cNvSpPr txBox="1"/>
-          <p:nvPr/>
-        </p:nvSpPr>
-        <p:spPr>
-          <a:xfrm>
-            <a:off x="2676179" y="2009179"/>
-            <a:ext cx="3777448" cy="338554"/>
-          </a:xfrm>
-          <a:prstGeom prst="rect">
-            <a:avLst/>
-          </a:prstGeom>
-          <a:noFill/>
-        </p:spPr>
-        <p:txBody>
-          <a:bodyPr wrap="square" rtlCol="0">
-            <a:spAutoFit/>
-          </a:bodyPr>
-          <a:lstStyle/>
-          <a:p>
-            <a:r>
-              <a:rPr lang="fr-FR" sz="1600" i="1" dirty="0">
-                <a:latin typeface="Century Gothic" panose="020B0502020202020204" pitchFamily="34" charset="0"/>
-              </a:rPr>
-              <a:t>Stars &amp; key to </a:t>
-            </a:r>
-            <a:r>
-              <a:rPr lang="fr-FR" sz="1600" i="1" dirty="0" err="1">
-                <a:latin typeface="Century Gothic" panose="020B0502020202020204" pitchFamily="34" charset="0"/>
-              </a:rPr>
-              <a:t>collect</a:t>
-            </a:r>
-            <a:r>
-              <a:rPr lang="fr-FR" sz="1600" i="1" dirty="0">
-                <a:latin typeface="Century Gothic" panose="020B0502020202020204" pitchFamily="34" charset="0"/>
-              </a:rPr>
-              <a:t>.</a:t>
-            </a:r>
-          </a:p>
-        </p:txBody>
-      </p:sp>
-      <p:pic>
-        <p:nvPicPr>
-          <p:cNvPr id="20" name="Image 19">
-            <a:extLst>
-              <a:ext uri="{FF2B5EF4-FFF2-40B4-BE49-F238E27FC236}">
-                <a16:creationId xmlns:a16="http://schemas.microsoft.com/office/drawing/2014/main" id="{62B38F98-ACB7-FA85-192D-5FF95514A7F9}"/>
-              </a:ext>
-            </a:extLst>
-          </p:cNvPr>
-          <p:cNvPicPr>
-            <a:picLocks noChangeAspect="1"/>
-          </p:cNvPicPr>
-          <p:nvPr/>
-        </p:nvPicPr>
-        <p:blipFill>
-          <a:blip r:embed="rId5"/>
-          <a:stretch>
-            <a:fillRect/>
-          </a:stretch>
-        </p:blipFill>
-        <p:spPr>
-          <a:xfrm>
-            <a:off x="2077756" y="2603169"/>
-            <a:ext cx="446021" cy="557526"/>
-          </a:xfrm>
-          <a:prstGeom prst="rect">
-            <a:avLst/>
-          </a:prstGeom>
-        </p:spPr>
-      </p:pic>
-      <p:sp>
-        <p:nvSpPr>
-          <p:cNvPr id="21" name="ZoneTexte 20">
-            <a:extLst>
-              <a:ext uri="{FF2B5EF4-FFF2-40B4-BE49-F238E27FC236}">
-                <a16:creationId xmlns:a16="http://schemas.microsoft.com/office/drawing/2014/main" id="{6BD7469E-C3DF-7AAC-D71F-15144654025A}"/>
-              </a:ext>
-            </a:extLst>
-          </p:cNvPr>
-          <p:cNvSpPr txBox="1"/>
-          <p:nvPr/>
-        </p:nvSpPr>
-        <p:spPr>
-          <a:xfrm>
-            <a:off x="2676178" y="2550067"/>
-            <a:ext cx="3777448" cy="892552"/>
-          </a:xfrm>
-          <a:prstGeom prst="rect">
-            <a:avLst/>
-          </a:prstGeom>
-          <a:noFill/>
-        </p:spPr>
-        <p:txBody>
-          <a:bodyPr wrap="square" rtlCol="0">
-            <a:spAutoFit/>
-          </a:bodyPr>
-          <a:lstStyle/>
-          <a:p>
-            <a:r>
-              <a:rPr lang="fr-FR" sz="1600" i="1" dirty="0" err="1">
-                <a:latin typeface="Century Gothic" panose="020B0502020202020204" pitchFamily="34" charset="0"/>
-              </a:rPr>
-              <a:t>Bomb</a:t>
-            </a:r>
-            <a:r>
-              <a:rPr lang="fr-FR" sz="1600" i="1" dirty="0">
-                <a:latin typeface="Century Gothic" panose="020B0502020202020204" pitchFamily="34" charset="0"/>
-              </a:rPr>
-              <a:t>. </a:t>
-            </a:r>
-            <a:br>
-              <a:rPr lang="fr-FR" sz="1600" i="1" dirty="0">
-                <a:latin typeface="Century Gothic" panose="020B0502020202020204" pitchFamily="34" charset="0"/>
-              </a:rPr>
-            </a:br>
-            <a:r>
-              <a:rPr lang="en-US" sz="1200" i="1" dirty="0">
-                <a:latin typeface="Century Gothic" panose="020B0502020202020204" pitchFamily="34" charset="0"/>
-              </a:rPr>
-              <a:t>Stick to a wall and press FIRE. </a:t>
-            </a:r>
-            <a:br>
-              <a:rPr lang="en-US" sz="1200" i="1" dirty="0">
-                <a:latin typeface="Century Gothic" panose="020B0502020202020204" pitchFamily="34" charset="0"/>
-              </a:rPr>
-            </a:br>
-            <a:r>
-              <a:rPr lang="en-US" sz="1200" i="1" dirty="0">
-                <a:latin typeface="Century Gothic" panose="020B0502020202020204" pitchFamily="34" charset="0"/>
-              </a:rPr>
-              <a:t>All the walls around </a:t>
-            </a:r>
-            <a:r>
-              <a:rPr lang="en-US" sz="1200" i="1" dirty="0" err="1">
-                <a:latin typeface="Century Gothic" panose="020B0502020202020204" pitchFamily="34" charset="0"/>
-              </a:rPr>
-              <a:t>Mabool</a:t>
-            </a:r>
-            <a:r>
-              <a:rPr lang="en-US" sz="1200" i="1" dirty="0">
-                <a:latin typeface="Century Gothic" panose="020B0502020202020204" pitchFamily="34" charset="0"/>
-              </a:rPr>
-              <a:t> will be destroyed.
-</a:t>
-            </a:r>
-            <a:endParaRPr lang="fr-FR" sz="1200" i="1" dirty="0">
-              <a:latin typeface="Century Gothic" panose="020B0502020202020204" pitchFamily="34" charset="0"/>
-            </a:endParaRPr>
-          </a:p>
-        </p:txBody>
-      </p:sp>
-      <p:pic>
-        <p:nvPicPr>
-          <p:cNvPr id="23" name="Image 22">
-            <a:extLst>
-              <a:ext uri="{FF2B5EF4-FFF2-40B4-BE49-F238E27FC236}">
-                <a16:creationId xmlns:a16="http://schemas.microsoft.com/office/drawing/2014/main" id="{E9377A75-AB99-3685-716B-2A39CEA12C06}"/>
-              </a:ext>
-            </a:extLst>
-          </p:cNvPr>
-          <p:cNvPicPr>
-            <a:picLocks noChangeAspect="1"/>
-          </p:cNvPicPr>
-          <p:nvPr/>
-        </p:nvPicPr>
-        <p:blipFill>
-          <a:blip r:embed="rId6"/>
-          <a:stretch>
-            <a:fillRect/>
-          </a:stretch>
-        </p:blipFill>
-        <p:spPr>
-          <a:xfrm>
-            <a:off x="2049881" y="3351657"/>
-            <a:ext cx="473896" cy="562751"/>
-          </a:xfrm>
-          <a:prstGeom prst="rect">
-            <a:avLst/>
-          </a:prstGeom>
-        </p:spPr>
-      </p:pic>
-      <p:sp>
-        <p:nvSpPr>
-          <p:cNvPr id="25" name="ZoneTexte 24">
-            <a:extLst>
-              <a:ext uri="{FF2B5EF4-FFF2-40B4-BE49-F238E27FC236}">
-                <a16:creationId xmlns:a16="http://schemas.microsoft.com/office/drawing/2014/main" id="{98B7D1CB-0EF6-0FA7-6AEE-C20424DACBAA}"/>
-              </a:ext>
-            </a:extLst>
-          </p:cNvPr>
-          <p:cNvSpPr txBox="1"/>
-          <p:nvPr/>
-        </p:nvSpPr>
-        <p:spPr>
-          <a:xfrm>
-            <a:off x="2676178" y="3327234"/>
-            <a:ext cx="3777448" cy="707886"/>
-          </a:xfrm>
-          <a:prstGeom prst="rect">
-            <a:avLst/>
-          </a:prstGeom>
-          <a:noFill/>
-        </p:spPr>
-        <p:txBody>
-          <a:bodyPr wrap="square" rtlCol="0">
-            <a:spAutoFit/>
-          </a:bodyPr>
-          <a:lstStyle/>
-          <a:p>
-            <a:r>
-              <a:rPr lang="fr-FR" sz="1600" i="1" dirty="0">
-                <a:latin typeface="Century Gothic" panose="020B0502020202020204" pitchFamily="34" charset="0"/>
-              </a:rPr>
-              <a:t>Exit </a:t>
-            </a:r>
-            <a:r>
-              <a:rPr lang="fr-FR" sz="1600" i="1" dirty="0" err="1">
-                <a:latin typeface="Century Gothic" panose="020B0502020202020204" pitchFamily="34" charset="0"/>
-              </a:rPr>
-              <a:t>door</a:t>
-            </a:r>
-            <a:r>
-              <a:rPr lang="fr-FR" sz="1600" i="1" dirty="0">
-                <a:latin typeface="Century Gothic" panose="020B0502020202020204" pitchFamily="34" charset="0"/>
-              </a:rPr>
-              <a:t>. </a:t>
-            </a:r>
-            <a:br>
-              <a:rPr lang="fr-FR" sz="1600" i="1" dirty="0">
-                <a:latin typeface="Century Gothic" panose="020B0502020202020204" pitchFamily="34" charset="0"/>
-              </a:rPr>
-            </a:br>
-            <a:r>
-              <a:rPr lang="en-US" sz="1200" i="1" dirty="0">
-                <a:latin typeface="Century Gothic" panose="020B0502020202020204" pitchFamily="34" charset="0"/>
-              </a:rPr>
-              <a:t>It will only open if </a:t>
-            </a:r>
-            <a:r>
-              <a:rPr lang="en-US" sz="1200" i="1" dirty="0" err="1">
-                <a:latin typeface="Century Gothic" panose="020B0502020202020204" pitchFamily="34" charset="0"/>
-              </a:rPr>
-              <a:t>Mabool</a:t>
-            </a:r>
-            <a:r>
-              <a:rPr lang="en-US" sz="1200" i="1" dirty="0">
-                <a:latin typeface="Century Gothic" panose="020B0502020202020204" pitchFamily="34" charset="0"/>
-              </a:rPr>
-              <a:t> has picked up all the stars and the key of each room.</a:t>
-            </a:r>
-            <a:endParaRPr lang="fr-FR" sz="1200" i="1" dirty="0">
-              <a:latin typeface="Century Gothic" panose="020B0502020202020204" pitchFamily="34" charset="0"/>
-            </a:endParaRPr>
-          </a:p>
-        </p:txBody>
-      </p:sp>
-      <p:pic>
-        <p:nvPicPr>
-          <p:cNvPr id="27" name="Image 26">
-            <a:extLst>
-              <a:ext uri="{FF2B5EF4-FFF2-40B4-BE49-F238E27FC236}">
-                <a16:creationId xmlns:a16="http://schemas.microsoft.com/office/drawing/2014/main" id="{98FF5E76-4F3C-484A-4D8B-87B045DC452C}"/>
-              </a:ext>
-            </a:extLst>
-          </p:cNvPr>
-          <p:cNvPicPr>
-            <a:picLocks noChangeAspect="1"/>
-          </p:cNvPicPr>
-          <p:nvPr/>
-        </p:nvPicPr>
-        <p:blipFill>
-          <a:blip r:embed="rId7"/>
-          <a:stretch>
-            <a:fillRect/>
-          </a:stretch>
-        </p:blipFill>
-        <p:spPr>
-          <a:xfrm>
-            <a:off x="2049882" y="4061968"/>
-            <a:ext cx="473895" cy="557524"/>
-          </a:xfrm>
-          <a:prstGeom prst="rect">
-            <a:avLst/>
-          </a:prstGeom>
-        </p:spPr>
-      </p:pic>
-      <p:sp>
-        <p:nvSpPr>
-          <p:cNvPr id="28" name="ZoneTexte 27">
-            <a:extLst>
-              <a:ext uri="{FF2B5EF4-FFF2-40B4-BE49-F238E27FC236}">
-                <a16:creationId xmlns:a16="http://schemas.microsoft.com/office/drawing/2014/main" id="{9AA3E2BF-B29E-49FF-3CC9-8E6964C56505}"/>
-              </a:ext>
-            </a:extLst>
-          </p:cNvPr>
-          <p:cNvSpPr txBox="1"/>
-          <p:nvPr/>
-        </p:nvSpPr>
-        <p:spPr>
-          <a:xfrm>
-            <a:off x="2676178" y="4006813"/>
-            <a:ext cx="3777448" cy="523220"/>
-          </a:xfrm>
-          <a:prstGeom prst="rect">
-            <a:avLst/>
-          </a:prstGeom>
-          <a:noFill/>
-        </p:spPr>
-        <p:txBody>
-          <a:bodyPr wrap="square" rtlCol="0">
-            <a:spAutoFit/>
-          </a:bodyPr>
-          <a:lstStyle/>
-          <a:p>
-            <a:r>
-              <a:rPr lang="fr-FR" sz="1600" i="1" dirty="0" err="1">
-                <a:latin typeface="Century Gothic" panose="020B0502020202020204" pitchFamily="34" charset="0"/>
-              </a:rPr>
-              <a:t>Elevator</a:t>
-            </a:r>
-            <a:r>
-              <a:rPr lang="fr-FR" sz="1600" i="1" dirty="0">
-                <a:latin typeface="Century Gothic" panose="020B0502020202020204" pitchFamily="34" charset="0"/>
-              </a:rPr>
-              <a:t>. </a:t>
-            </a:r>
-            <a:br>
-              <a:rPr lang="fr-FR" sz="1600" i="1" dirty="0">
-                <a:latin typeface="Century Gothic" panose="020B0502020202020204" pitchFamily="34" charset="0"/>
-              </a:rPr>
-            </a:br>
-            <a:r>
-              <a:rPr lang="en-US" sz="1200" i="1" dirty="0">
-                <a:latin typeface="Century Gothic" panose="020B0502020202020204" pitchFamily="34" charset="0"/>
-              </a:rPr>
-              <a:t>Allows </a:t>
-            </a:r>
-            <a:r>
-              <a:rPr lang="en-US" sz="1200" i="1" dirty="0" err="1">
-                <a:latin typeface="Century Gothic" panose="020B0502020202020204" pitchFamily="34" charset="0"/>
-              </a:rPr>
-              <a:t>Mabool</a:t>
-            </a:r>
-            <a:r>
-              <a:rPr lang="en-US" sz="1200" i="1" dirty="0">
-                <a:latin typeface="Century Gothic" panose="020B0502020202020204" pitchFamily="34" charset="0"/>
-              </a:rPr>
-              <a:t> to move above the void.</a:t>
-            </a:r>
-            <a:endParaRPr lang="fr-FR" sz="1200" i="1" dirty="0">
-              <a:latin typeface="Century Gothic" panose="020B0502020202020204" pitchFamily="34" charset="0"/>
-            </a:endParaRPr>
-          </a:p>
-        </p:txBody>
-      </p:sp>
-      <p:pic>
-        <p:nvPicPr>
-          <p:cNvPr id="30" name="Image 29">
-            <a:extLst>
-              <a:ext uri="{FF2B5EF4-FFF2-40B4-BE49-F238E27FC236}">
-                <a16:creationId xmlns:a16="http://schemas.microsoft.com/office/drawing/2014/main" id="{914C1B42-EDC1-6415-4E95-27B5183E2D3F}"/>
-              </a:ext>
-            </a:extLst>
-          </p:cNvPr>
-          <p:cNvPicPr>
-            <a:picLocks noChangeAspect="1"/>
-          </p:cNvPicPr>
-          <p:nvPr/>
-        </p:nvPicPr>
-        <p:blipFill>
-          <a:blip r:embed="rId8"/>
-          <a:stretch>
-            <a:fillRect/>
-          </a:stretch>
-        </p:blipFill>
-        <p:spPr>
-          <a:xfrm>
-            <a:off x="2049882" y="4788831"/>
-            <a:ext cx="473896" cy="557524"/>
-          </a:xfrm>
-          <a:prstGeom prst="rect">
-            <a:avLst/>
-          </a:prstGeom>
-        </p:spPr>
-      </p:pic>
-      <p:sp>
-        <p:nvSpPr>
-          <p:cNvPr id="31" name="ZoneTexte 30">
-            <a:extLst>
-              <a:ext uri="{FF2B5EF4-FFF2-40B4-BE49-F238E27FC236}">
-                <a16:creationId xmlns:a16="http://schemas.microsoft.com/office/drawing/2014/main" id="{B5538699-9762-BFBB-5B90-6A7347CE8CF6}"/>
-              </a:ext>
-            </a:extLst>
-          </p:cNvPr>
-          <p:cNvSpPr txBox="1"/>
-          <p:nvPr/>
-        </p:nvSpPr>
-        <p:spPr>
-          <a:xfrm>
-            <a:off x="2676178" y="4754590"/>
-            <a:ext cx="3777448" cy="707886"/>
-          </a:xfrm>
-          <a:prstGeom prst="rect">
-            <a:avLst/>
-          </a:prstGeom>
-          <a:noFill/>
-        </p:spPr>
-        <p:txBody>
-          <a:bodyPr wrap="square" rtlCol="0">
-            <a:spAutoFit/>
-          </a:bodyPr>
-          <a:lstStyle/>
-          <a:p>
-            <a:r>
-              <a:rPr lang="fr-FR" sz="1600" i="1" dirty="0" err="1">
-                <a:latin typeface="Century Gothic" panose="020B0502020202020204" pitchFamily="34" charset="0"/>
-              </a:rPr>
-              <a:t>Teleporter</a:t>
-            </a:r>
-            <a:r>
-              <a:rPr lang="fr-FR" sz="1600" i="1" dirty="0">
-                <a:latin typeface="Century Gothic" panose="020B0502020202020204" pitchFamily="34" charset="0"/>
-              </a:rPr>
-              <a:t>. </a:t>
-            </a:r>
-            <a:br>
-              <a:rPr lang="fr-FR" sz="1600" i="1" dirty="0">
-                <a:latin typeface="Century Gothic" panose="020B0502020202020204" pitchFamily="34" charset="0"/>
-              </a:rPr>
-            </a:br>
-            <a:r>
-              <a:rPr lang="en-US" sz="1200" i="1" dirty="0">
-                <a:latin typeface="Century Gothic" panose="020B0502020202020204" pitchFamily="34" charset="0"/>
-              </a:rPr>
-              <a:t>Allows </a:t>
-            </a:r>
-            <a:r>
-              <a:rPr lang="en-US" sz="1200" i="1" dirty="0" err="1">
-                <a:latin typeface="Century Gothic" panose="020B0502020202020204" pitchFamily="34" charset="0"/>
-              </a:rPr>
-              <a:t>Mabool</a:t>
-            </a:r>
-            <a:r>
-              <a:rPr lang="en-US" sz="1200" i="1" dirty="0">
-                <a:latin typeface="Century Gothic" panose="020B0502020202020204" pitchFamily="34" charset="0"/>
-              </a:rPr>
-              <a:t> to move to another teleporter present in the room.</a:t>
-            </a:r>
-            <a:endParaRPr lang="fr-FR" sz="1200" i="1" dirty="0">
-              <a:latin typeface="Century Gothic" panose="020B0502020202020204" pitchFamily="34" charset="0"/>
-            </a:endParaRPr>
-          </a:p>
-        </p:txBody>
-      </p:sp>
-      <p:pic>
-        <p:nvPicPr>
-          <p:cNvPr id="2" name="Image 1">
-            <a:extLst>
-              <a:ext uri="{FF2B5EF4-FFF2-40B4-BE49-F238E27FC236}">
-                <a16:creationId xmlns:a16="http://schemas.microsoft.com/office/drawing/2014/main" id="{ABADC6C4-32F8-4AED-0D12-6BD8BA133C76}"/>
-              </a:ext>
-            </a:extLst>
-          </p:cNvPr>
-          <p:cNvPicPr>
-            <a:picLocks noChangeAspect="1"/>
-          </p:cNvPicPr>
-          <p:nvPr/>
-        </p:nvPicPr>
-        <p:blipFill>
-          <a:blip r:embed="rId9"/>
-          <a:stretch>
-            <a:fillRect/>
-          </a:stretch>
-        </p:blipFill>
-        <p:spPr>
-          <a:xfrm>
-            <a:off x="2722159" y="6227574"/>
-            <a:ext cx="2027756" cy="509192"/>
-          </a:xfrm>
-          <a:prstGeom prst="rect">
-            <a:avLst/>
-          </a:prstGeom>
-        </p:spPr>
-      </p:pic>
-    </p:spTree>
-    <p:extLst>
-      <p:ext uri="{BB962C8B-B14F-4D97-AF65-F5344CB8AC3E}">
-        <p14:creationId xmlns:p14="http://schemas.microsoft.com/office/powerpoint/2010/main" val="1795726103"/>
-      </p:ext>
-    </p:extLst>
-  </p:cSld>
-  <p:clrMapOvr>
-    <a:masterClrMapping/>
-  </p:clrMapOvr>
-</p:sld>
-</file>
-
 <file path=ppt/theme/theme1.xml><?xml version="1.0" encoding="utf-8"?>
 <a:theme xmlns:a="http://schemas.openxmlformats.org/drawingml/2006/main" name="Thème Office">
   <a:themeElements>

</xml_diff>

<commit_message>
Updates for next Release
</commit_message>
<xml_diff>
--- a/docs/mabool_exelvision_cover.pptx
+++ b/docs/mabool_exelvision_cover.pptx
@@ -1434,7 +1434,7 @@
           <a:p>
             <a:fld id="{BE9DA22A-5204-4573-9C67-011E2DB24967}" type="datetimeFigureOut">
               <a:rPr lang="fr-FR" smtClean="0"/>
-              <a:t>01/01/2023</a:t>
+              <a:t>02/01/2023</a:t>
             </a:fld>
             <a:endParaRPr lang="fr-FR"/>
           </a:p>
@@ -1632,7 +1632,7 @@
           <a:p>
             <a:fld id="{BE9DA22A-5204-4573-9C67-011E2DB24967}" type="datetimeFigureOut">
               <a:rPr lang="fr-FR" smtClean="0"/>
-              <a:t>01/01/2023</a:t>
+              <a:t>02/01/2023</a:t>
             </a:fld>
             <a:endParaRPr lang="fr-FR"/>
           </a:p>
@@ -1840,7 +1840,7 @@
           <a:p>
             <a:fld id="{BE9DA22A-5204-4573-9C67-011E2DB24967}" type="datetimeFigureOut">
               <a:rPr lang="fr-FR" smtClean="0"/>
-              <a:t>01/01/2023</a:t>
+              <a:t>02/01/2023</a:t>
             </a:fld>
             <a:endParaRPr lang="fr-FR"/>
           </a:p>
@@ -2038,7 +2038,7 @@
           <a:p>
             <a:fld id="{BE9DA22A-5204-4573-9C67-011E2DB24967}" type="datetimeFigureOut">
               <a:rPr lang="fr-FR" smtClean="0"/>
-              <a:t>01/01/2023</a:t>
+              <a:t>02/01/2023</a:t>
             </a:fld>
             <a:endParaRPr lang="fr-FR"/>
           </a:p>
@@ -2313,7 +2313,7 @@
           <a:p>
             <a:fld id="{BE9DA22A-5204-4573-9C67-011E2DB24967}" type="datetimeFigureOut">
               <a:rPr lang="fr-FR" smtClean="0"/>
-              <a:t>01/01/2023</a:t>
+              <a:t>02/01/2023</a:t>
             </a:fld>
             <a:endParaRPr lang="fr-FR"/>
           </a:p>
@@ -2578,7 +2578,7 @@
           <a:p>
             <a:fld id="{BE9DA22A-5204-4573-9C67-011E2DB24967}" type="datetimeFigureOut">
               <a:rPr lang="fr-FR" smtClean="0"/>
-              <a:t>01/01/2023</a:t>
+              <a:t>02/01/2023</a:t>
             </a:fld>
             <a:endParaRPr lang="fr-FR"/>
           </a:p>
@@ -2990,7 +2990,7 @@
           <a:p>
             <a:fld id="{BE9DA22A-5204-4573-9C67-011E2DB24967}" type="datetimeFigureOut">
               <a:rPr lang="fr-FR" smtClean="0"/>
-              <a:t>01/01/2023</a:t>
+              <a:t>02/01/2023</a:t>
             </a:fld>
             <a:endParaRPr lang="fr-FR"/>
           </a:p>
@@ -3131,7 +3131,7 @@
           <a:p>
             <a:fld id="{BE9DA22A-5204-4573-9C67-011E2DB24967}" type="datetimeFigureOut">
               <a:rPr lang="fr-FR" smtClean="0"/>
-              <a:t>01/01/2023</a:t>
+              <a:t>02/01/2023</a:t>
             </a:fld>
             <a:endParaRPr lang="fr-FR"/>
           </a:p>
@@ -3244,7 +3244,7 @@
           <a:p>
             <a:fld id="{BE9DA22A-5204-4573-9C67-011E2DB24967}" type="datetimeFigureOut">
               <a:rPr lang="fr-FR" smtClean="0"/>
-              <a:t>01/01/2023</a:t>
+              <a:t>02/01/2023</a:t>
             </a:fld>
             <a:endParaRPr lang="fr-FR"/>
           </a:p>
@@ -3555,7 +3555,7 @@
           <a:p>
             <a:fld id="{BE9DA22A-5204-4573-9C67-011E2DB24967}" type="datetimeFigureOut">
               <a:rPr lang="fr-FR" smtClean="0"/>
-              <a:t>01/01/2023</a:t>
+              <a:t>02/01/2023</a:t>
             </a:fld>
             <a:endParaRPr lang="fr-FR"/>
           </a:p>
@@ -3843,7 +3843,7 @@
           <a:p>
             <a:fld id="{BE9DA22A-5204-4573-9C67-011E2DB24967}" type="datetimeFigureOut">
               <a:rPr lang="fr-FR" smtClean="0"/>
-              <a:t>01/01/2023</a:t>
+              <a:t>02/01/2023</a:t>
             </a:fld>
             <a:endParaRPr lang="fr-FR"/>
           </a:p>
@@ -4084,7 +4084,7 @@
           <a:p>
             <a:fld id="{BE9DA22A-5204-4573-9C67-011E2DB24967}" type="datetimeFigureOut">
               <a:rPr lang="fr-FR" smtClean="0"/>
-              <a:t>01/01/2023</a:t>
+              <a:t>02/01/2023</a:t>
             </a:fld>
             <a:endParaRPr lang="fr-FR"/>
           </a:p>
@@ -27515,12 +27515,64 @@
           </a:effectLst>
         </p:spPr>
       </p:pic>
+      <p:sp>
+        <p:nvSpPr>
+          <p:cNvPr id="2" name="Rectangle 1">
+            <a:extLst>
+              <a:ext uri="{FF2B5EF4-FFF2-40B4-BE49-F238E27FC236}">
+                <a16:creationId xmlns:a16="http://schemas.microsoft.com/office/drawing/2014/main" id="{6A693D0F-F1A0-7B3A-C1F9-303B2697728B}"/>
+              </a:ext>
+            </a:extLst>
+          </p:cNvPr>
+          <p:cNvSpPr/>
+          <p:nvPr/>
+        </p:nvSpPr>
+        <p:spPr>
+          <a:xfrm>
+            <a:off x="3243096" y="4810538"/>
+            <a:ext cx="6000749" cy="707721"/>
+          </a:xfrm>
+          <a:prstGeom prst="rect">
+            <a:avLst/>
+          </a:prstGeom>
+          <a:solidFill>
+            <a:schemeClr val="tx1"/>
+          </a:solidFill>
+          <a:ln>
+            <a:noFill/>
+          </a:ln>
+        </p:spPr>
+        <p:style>
+          <a:lnRef idx="2">
+            <a:schemeClr val="accent1">
+              <a:shade val="50000"/>
+            </a:schemeClr>
+          </a:lnRef>
+          <a:fillRef idx="1">
+            <a:schemeClr val="accent1"/>
+          </a:fillRef>
+          <a:effectRef idx="0">
+            <a:schemeClr val="accent1"/>
+          </a:effectRef>
+          <a:fontRef idx="minor">
+            <a:schemeClr val="lt1"/>
+          </a:fontRef>
+        </p:style>
+        <p:txBody>
+          <a:bodyPr rtlCol="0" anchor="ctr"/>
+          <a:lstStyle/>
+          <a:p>
+            <a:pPr algn="ctr"/>
+            <a:endParaRPr lang="fr-FR"/>
+          </a:p>
+        </p:txBody>
+      </p:sp>
       <p:pic>
         <p:nvPicPr>
-          <p:cNvPr id="11" name="Image 10">
+          <p:cNvPr id="5" name="Image 4">
             <a:extLst>
               <a:ext uri="{FF2B5EF4-FFF2-40B4-BE49-F238E27FC236}">
-                <a16:creationId xmlns:a16="http://schemas.microsoft.com/office/drawing/2014/main" id="{6EED9F1E-E1E7-A136-2FD4-2C8B10DF0EF7}"/>
+                <a16:creationId xmlns:a16="http://schemas.microsoft.com/office/drawing/2014/main" id="{007E3350-2DB4-6AE1-2978-992DA2A47898}"/>
               </a:ext>
             </a:extLst>
           </p:cNvPr>
@@ -27531,6 +27583,7 @@
         </p:nvPicPr>
         <p:blipFill>
           <a:blip r:embed="rId5">
+            <a:lum bright="70000" contrast="-70000"/>
             <a:extLst>
               <a:ext uri="{BEBA8EAE-BF5A-486C-A8C5-ECC9F3942E4B}">
                 <a14:imgProps xmlns:a14="http://schemas.microsoft.com/office/drawing/2010/main">
@@ -27549,8 +27602,38 @@
         </p:blipFill>
         <p:spPr>
           <a:xfrm>
-            <a:off x="3421633" y="4900412"/>
+            <a:off x="7037667" y="4881764"/>
             <a:ext cx="2050472" cy="514896"/>
+          </a:xfrm>
+          <a:prstGeom prst="rect">
+            <a:avLst/>
+          </a:prstGeom>
+        </p:spPr>
+      </p:pic>
+      <p:pic>
+        <p:nvPicPr>
+          <p:cNvPr id="8" name="Image 7">
+            <a:extLst>
+              <a:ext uri="{FF2B5EF4-FFF2-40B4-BE49-F238E27FC236}">
+                <a16:creationId xmlns:a16="http://schemas.microsoft.com/office/drawing/2014/main" id="{0656B75C-B3D0-E5B9-0946-FD17DEDD4DEA}"/>
+              </a:ext>
+            </a:extLst>
+          </p:cNvPr>
+          <p:cNvPicPr>
+            <a:picLocks noChangeAspect="1"/>
+          </p:cNvPicPr>
+          <p:nvPr/>
+        </p:nvPicPr>
+        <p:blipFill>
+          <a:blip r:embed="rId7"/>
+          <a:stretch>
+            <a:fillRect/>
+          </a:stretch>
+        </p:blipFill>
+        <p:spPr>
+          <a:xfrm rot="5400000">
+            <a:off x="3983902" y="4583458"/>
+            <a:ext cx="235988" cy="1198824"/>
           </a:xfrm>
           <a:prstGeom prst="rect">
             <a:avLst/>

</xml_diff>